<commit_message>
Prediction of lever pressed based on signal
</commit_message>
<xml_diff>
--- a/PhotometryML.pptx
+++ b/PhotometryML.pptx
@@ -7,10 +7,13 @@
   <p:sldIdLst>
     <p:sldId id="256" r:id="rId2"/>
     <p:sldId id="258" r:id="rId3"/>
-    <p:sldId id="257" r:id="rId4"/>
-    <p:sldId id="259" r:id="rId5"/>
-    <p:sldId id="261" r:id="rId6"/>
-    <p:sldId id="260" r:id="rId7"/>
+    <p:sldId id="263" r:id="rId4"/>
+    <p:sldId id="262" r:id="rId5"/>
+    <p:sldId id="257" r:id="rId6"/>
+    <p:sldId id="259" r:id="rId7"/>
+    <p:sldId id="261" r:id="rId8"/>
+    <p:sldId id="264" r:id="rId9"/>
+    <p:sldId id="260" r:id="rId10"/>
   </p:sldIdLst>
   <p:sldSz cx="12192000" cy="6858000"/>
   <p:notesSz cx="6858000" cy="9144000"/>
@@ -264,7 +267,7 @@
           <a:p>
             <a:fld id="{0629DF27-FCFD-4372-AAF6-F331E8A67D77}" type="datetimeFigureOut">
               <a:rPr lang="en-US" smtClean="0"/>
-              <a:t>1/3/2024</a:t>
+              <a:t>1/4/2024</a:t>
             </a:fld>
             <a:endParaRPr lang="en-US"/>
           </a:p>
@@ -462,7 +465,7 @@
           <a:p>
             <a:fld id="{0629DF27-FCFD-4372-AAF6-F331E8A67D77}" type="datetimeFigureOut">
               <a:rPr lang="en-US" smtClean="0"/>
-              <a:t>1/3/2024</a:t>
+              <a:t>1/4/2024</a:t>
             </a:fld>
             <a:endParaRPr lang="en-US"/>
           </a:p>
@@ -670,7 +673,7 @@
           <a:p>
             <a:fld id="{0629DF27-FCFD-4372-AAF6-F331E8A67D77}" type="datetimeFigureOut">
               <a:rPr lang="en-US" smtClean="0"/>
-              <a:t>1/3/2024</a:t>
+              <a:t>1/4/2024</a:t>
             </a:fld>
             <a:endParaRPr lang="en-US"/>
           </a:p>
@@ -868,7 +871,7 @@
           <a:p>
             <a:fld id="{0629DF27-FCFD-4372-AAF6-F331E8A67D77}" type="datetimeFigureOut">
               <a:rPr lang="en-US" smtClean="0"/>
-              <a:t>1/3/2024</a:t>
+              <a:t>1/4/2024</a:t>
             </a:fld>
             <a:endParaRPr lang="en-US"/>
           </a:p>
@@ -1143,7 +1146,7 @@
           <a:p>
             <a:fld id="{0629DF27-FCFD-4372-AAF6-F331E8A67D77}" type="datetimeFigureOut">
               <a:rPr lang="en-US" smtClean="0"/>
-              <a:t>1/3/2024</a:t>
+              <a:t>1/4/2024</a:t>
             </a:fld>
             <a:endParaRPr lang="en-US"/>
           </a:p>
@@ -1408,7 +1411,7 @@
           <a:p>
             <a:fld id="{0629DF27-FCFD-4372-AAF6-F331E8A67D77}" type="datetimeFigureOut">
               <a:rPr lang="en-US" smtClean="0"/>
-              <a:t>1/3/2024</a:t>
+              <a:t>1/4/2024</a:t>
             </a:fld>
             <a:endParaRPr lang="en-US"/>
           </a:p>
@@ -1820,7 +1823,7 @@
           <a:p>
             <a:fld id="{0629DF27-FCFD-4372-AAF6-F331E8A67D77}" type="datetimeFigureOut">
               <a:rPr lang="en-US" smtClean="0"/>
-              <a:t>1/3/2024</a:t>
+              <a:t>1/4/2024</a:t>
             </a:fld>
             <a:endParaRPr lang="en-US"/>
           </a:p>
@@ -1961,7 +1964,7 @@
           <a:p>
             <a:fld id="{0629DF27-FCFD-4372-AAF6-F331E8A67D77}" type="datetimeFigureOut">
               <a:rPr lang="en-US" smtClean="0"/>
-              <a:t>1/3/2024</a:t>
+              <a:t>1/4/2024</a:t>
             </a:fld>
             <a:endParaRPr lang="en-US"/>
           </a:p>
@@ -2074,7 +2077,7 @@
           <a:p>
             <a:fld id="{0629DF27-FCFD-4372-AAF6-F331E8A67D77}" type="datetimeFigureOut">
               <a:rPr lang="en-US" smtClean="0"/>
-              <a:t>1/3/2024</a:t>
+              <a:t>1/4/2024</a:t>
             </a:fld>
             <a:endParaRPr lang="en-US"/>
           </a:p>
@@ -2385,7 +2388,7 @@
           <a:p>
             <a:fld id="{0629DF27-FCFD-4372-AAF6-F331E8A67D77}" type="datetimeFigureOut">
               <a:rPr lang="en-US" smtClean="0"/>
-              <a:t>1/3/2024</a:t>
+              <a:t>1/4/2024</a:t>
             </a:fld>
             <a:endParaRPr lang="en-US"/>
           </a:p>
@@ -2673,7 +2676,7 @@
           <a:p>
             <a:fld id="{0629DF27-FCFD-4372-AAF6-F331E8A67D77}" type="datetimeFigureOut">
               <a:rPr lang="en-US" smtClean="0"/>
-              <a:t>1/3/2024</a:t>
+              <a:t>1/4/2024</a:t>
             </a:fld>
             <a:endParaRPr lang="en-US"/>
           </a:p>
@@ -2914,7 +2917,7 @@
           <a:p>
             <a:fld id="{0629DF27-FCFD-4372-AAF6-F331E8A67D77}" type="datetimeFigureOut">
               <a:rPr lang="en-US" smtClean="0"/>
-              <a:t>1/3/2024</a:t>
+              <a:t>1/4/2024</a:t>
             </a:fld>
             <a:endParaRPr lang="en-US"/>
           </a:p>
@@ -3429,7 +3432,7 @@
         <p:spPr>
           <a:xfrm>
             <a:off x="0" y="0"/>
-            <a:ext cx="12192000" cy="523220"/>
+            <a:ext cx="1686560" cy="523220"/>
           </a:xfrm>
           <a:prstGeom prst="rect">
             <a:avLst/>
@@ -3444,7 +3447,7 @@
           <a:p>
             <a:r>
               <a:rPr lang="en-US" sz="2800" dirty="0"/>
-              <a:t>Input data (100to300behavior.csv)</a:t>
+              <a:t>Input data</a:t>
             </a:r>
           </a:p>
         </p:txBody>
@@ -3471,8 +3474,8 @@
         </p:blipFill>
         <p:spPr>
           <a:xfrm>
-            <a:off x="1237516" y="815676"/>
-            <a:ext cx="9278083" cy="3497124"/>
+            <a:off x="108928" y="828948"/>
+            <a:ext cx="5828652" cy="2196954"/>
           </a:xfrm>
           <a:prstGeom prst="rect">
             <a:avLst/>
@@ -3493,8 +3496,8 @@
         </p:nvSpPr>
         <p:spPr>
           <a:xfrm>
-            <a:off x="0" y="5780782"/>
-            <a:ext cx="12191999" cy="1077218"/>
+            <a:off x="1" y="3331630"/>
+            <a:ext cx="6289039" cy="2062103"/>
           </a:xfrm>
           <a:prstGeom prst="rect">
             <a:avLst/>
@@ -3517,7 +3520,7 @@
             </a:r>
             <a:r>
               <a:rPr lang="en-US" sz="1600" dirty="0"/>
-              <a:t> taken from 5-days of 100-300uA RDT behavior from 6 rats </a:t>
+              <a:t> from 5-days of 100-300uA RDT behavior from 6 rats </a:t>
             </a:r>
           </a:p>
           <a:p>
@@ -3527,15 +3530,7 @@
             </a:pPr>
             <a:r>
               <a:rPr lang="en-US" sz="1600" dirty="0"/>
-              <a:t>WSP29 is removed for low signal, Trials where </a:t>
-            </a:r>
-            <a:r>
-              <a:rPr lang="en-US" sz="1600" dirty="0" err="1"/>
-              <a:t>NextLever</a:t>
-            </a:r>
-            <a:r>
-              <a:rPr lang="en-US" sz="1600" dirty="0"/>
-              <a:t> is omitted are removed and Last trials in a block are removed</a:t>
+              <a:t>Block 1 is removed to train model on changes in signal w/ shock</a:t>
             </a:r>
           </a:p>
           <a:p>
@@ -3545,7 +3540,7 @@
             </a:pPr>
             <a:r>
               <a:rPr lang="en-US" sz="1600" dirty="0"/>
-              <a:t>Lever press is binarized (0=small, 1=large)</a:t>
+              <a:t>WSP29 is removed for low signal</a:t>
             </a:r>
           </a:p>
           <a:p>
@@ -3555,6 +3550,44 @@
             </a:pPr>
             <a:r>
               <a:rPr lang="en-US" sz="1600" dirty="0"/>
+              <a:t>Trials where </a:t>
+            </a:r>
+            <a:r>
+              <a:rPr lang="en-US" sz="1600" dirty="0" err="1"/>
+              <a:t>NextLever</a:t>
+            </a:r>
+            <a:r>
+              <a:rPr lang="en-US" sz="1600" dirty="0"/>
+              <a:t> is omitted are removed</a:t>
+            </a:r>
+          </a:p>
+          <a:p>
+            <a:pPr marL="285750" indent="-285750">
+              <a:buFont typeface="Arial" panose="020B0604020202020204" pitchFamily="34" charset="0"/>
+              <a:buChar char="•"/>
+            </a:pPr>
+            <a:r>
+              <a:rPr lang="en-US" sz="1600" dirty="0"/>
+              <a:t>Last trials in a block are removed</a:t>
+            </a:r>
+          </a:p>
+          <a:p>
+            <a:pPr marL="285750" indent="-285750">
+              <a:buFont typeface="Arial" panose="020B0604020202020204" pitchFamily="34" charset="0"/>
+              <a:buChar char="•"/>
+            </a:pPr>
+            <a:r>
+              <a:rPr lang="en-US" sz="1600" dirty="0"/>
+              <a:t>Lever press is binarized (0=small, 1=large)</a:t>
+            </a:r>
+          </a:p>
+          <a:p>
+            <a:pPr marL="285750" indent="-285750">
+              <a:buFont typeface="Arial" panose="020B0604020202020204" pitchFamily="34" charset="0"/>
+              <a:buChar char="•"/>
+            </a:pPr>
+            <a:r>
+              <a:rPr lang="en-US" sz="1600" dirty="0"/>
               <a:t>Results in a 2345 by 13 </a:t>
             </a:r>
             <a:r>
@@ -3563,8 +3596,246 @@
             </a:r>
             <a:endParaRPr lang="en-US" sz="1600" dirty="0"/>
           </a:p>
-        </p:txBody>
-      </p:sp>
+          <a:p>
+            <a:pPr marL="285750" indent="-285750">
+              <a:buFont typeface="Arial" panose="020B0604020202020204" pitchFamily="34" charset="0"/>
+              <a:buChar char="•"/>
+            </a:pPr>
+            <a:r>
+              <a:rPr lang="en-US" sz="1600" dirty="0"/>
+              <a:t>Small=179, Large = 2166</a:t>
+            </a:r>
+          </a:p>
+        </p:txBody>
+      </p:sp>
+      <p:sp>
+        <p:nvSpPr>
+          <p:cNvPr id="6" name="TextBox 5">
+            <a:extLst>
+              <a:ext uri="{FF2B5EF4-FFF2-40B4-BE49-F238E27FC236}">
+                <a16:creationId xmlns:a16="http://schemas.microsoft.com/office/drawing/2014/main" id="{BD04FCC6-289A-CCCC-8E36-15F10AD74EAC}"/>
+              </a:ext>
+            </a:extLst>
+          </p:cNvPr>
+          <p:cNvSpPr txBox="1"/>
+          <p:nvPr/>
+        </p:nvSpPr>
+        <p:spPr>
+          <a:xfrm>
+            <a:off x="2174240" y="459616"/>
+            <a:ext cx="2580640" cy="369332"/>
+          </a:xfrm>
+          <a:prstGeom prst="rect">
+            <a:avLst/>
+          </a:prstGeom>
+          <a:noFill/>
+        </p:spPr>
+        <p:txBody>
+          <a:bodyPr wrap="square">
+            <a:spAutoFit/>
+          </a:bodyPr>
+          <a:lstStyle/>
+          <a:p>
+            <a:r>
+              <a:rPr lang="en-US" sz="1800" dirty="0"/>
+              <a:t>100to300behavior.csv</a:t>
+            </a:r>
+            <a:endParaRPr lang="en-US" dirty="0"/>
+          </a:p>
+        </p:txBody>
+      </p:sp>
+      <p:sp>
+        <p:nvSpPr>
+          <p:cNvPr id="7" name="TextBox 6">
+            <a:extLst>
+              <a:ext uri="{FF2B5EF4-FFF2-40B4-BE49-F238E27FC236}">
+                <a16:creationId xmlns:a16="http://schemas.microsoft.com/office/drawing/2014/main" id="{0332EF99-99BE-581F-B82A-4915C7BAE578}"/>
+              </a:ext>
+            </a:extLst>
+          </p:cNvPr>
+          <p:cNvSpPr txBox="1"/>
+          <p:nvPr/>
+        </p:nvSpPr>
+        <p:spPr>
+          <a:xfrm>
+            <a:off x="8209280" y="459616"/>
+            <a:ext cx="2580640" cy="369332"/>
+          </a:xfrm>
+          <a:prstGeom prst="rect">
+            <a:avLst/>
+          </a:prstGeom>
+          <a:noFill/>
+        </p:spPr>
+        <p:txBody>
+          <a:bodyPr wrap="square">
+            <a:spAutoFit/>
+          </a:bodyPr>
+          <a:lstStyle/>
+          <a:p>
+            <a:r>
+              <a:rPr lang="en-US" sz="1800" dirty="0"/>
+              <a:t>300behavior.csv</a:t>
+            </a:r>
+            <a:endParaRPr lang="en-US" dirty="0"/>
+          </a:p>
+        </p:txBody>
+      </p:sp>
+      <p:sp>
+        <p:nvSpPr>
+          <p:cNvPr id="8" name="TextBox 7">
+            <a:extLst>
+              <a:ext uri="{FF2B5EF4-FFF2-40B4-BE49-F238E27FC236}">
+                <a16:creationId xmlns:a16="http://schemas.microsoft.com/office/drawing/2014/main" id="{42E11EE4-8E06-CF9C-5796-74EE6A33A49C}"/>
+              </a:ext>
+            </a:extLst>
+          </p:cNvPr>
+          <p:cNvSpPr txBox="1"/>
+          <p:nvPr/>
+        </p:nvSpPr>
+        <p:spPr>
+          <a:xfrm>
+            <a:off x="6553200" y="3331630"/>
+            <a:ext cx="5547361" cy="2554545"/>
+          </a:xfrm>
+          <a:prstGeom prst="rect">
+            <a:avLst/>
+          </a:prstGeom>
+          <a:noFill/>
+        </p:spPr>
+        <p:txBody>
+          <a:bodyPr wrap="square" rtlCol="0">
+            <a:spAutoFit/>
+          </a:bodyPr>
+          <a:lstStyle/>
+          <a:p>
+            <a:r>
+              <a:rPr lang="en-US" sz="1600" dirty="0"/>
+              <a:t>1677 by 12 </a:t>
+            </a:r>
+            <a:r>
+              <a:rPr lang="en-US" sz="1600" dirty="0" err="1"/>
+              <a:t>dataframe</a:t>
+            </a:r>
+            <a:r>
+              <a:rPr lang="en-US" sz="1600" dirty="0"/>
+              <a:t> from 5-days of 100-300uA RDT behavior from 6 rats </a:t>
+            </a:r>
+          </a:p>
+          <a:p>
+            <a:pPr marL="285750" indent="-285750">
+              <a:buFont typeface="Arial" panose="020B0604020202020204" pitchFamily="34" charset="0"/>
+              <a:buChar char="•"/>
+            </a:pPr>
+            <a:r>
+              <a:rPr lang="en-US" sz="1600" dirty="0"/>
+              <a:t>Block 1 is removed to train model on changes in signal w/ shock</a:t>
+            </a:r>
+          </a:p>
+          <a:p>
+            <a:pPr marL="285750" indent="-285750">
+              <a:buFont typeface="Arial" panose="020B0604020202020204" pitchFamily="34" charset="0"/>
+              <a:buChar char="•"/>
+            </a:pPr>
+            <a:r>
+              <a:rPr lang="en-US" sz="1600" dirty="0"/>
+              <a:t>WSP29 is removed for low signal</a:t>
+            </a:r>
+          </a:p>
+          <a:p>
+            <a:pPr marL="285750" indent="-285750">
+              <a:buFont typeface="Arial" panose="020B0604020202020204" pitchFamily="34" charset="0"/>
+              <a:buChar char="•"/>
+            </a:pPr>
+            <a:r>
+              <a:rPr lang="en-US" sz="1600" dirty="0"/>
+              <a:t>Trials where </a:t>
+            </a:r>
+            <a:r>
+              <a:rPr lang="en-US" sz="1600" dirty="0" err="1"/>
+              <a:t>NextLever</a:t>
+            </a:r>
+            <a:r>
+              <a:rPr lang="en-US" sz="1600" dirty="0"/>
+              <a:t> is omitted are removed </a:t>
+            </a:r>
+          </a:p>
+          <a:p>
+            <a:pPr marL="285750" indent="-285750">
+              <a:buFont typeface="Arial" panose="020B0604020202020204" pitchFamily="34" charset="0"/>
+              <a:buChar char="•"/>
+            </a:pPr>
+            <a:r>
+              <a:rPr lang="en-US" sz="1600" dirty="0"/>
+              <a:t>Last trials in a block are removed</a:t>
+            </a:r>
+          </a:p>
+          <a:p>
+            <a:pPr marL="285750" indent="-285750">
+              <a:buFont typeface="Arial" panose="020B0604020202020204" pitchFamily="34" charset="0"/>
+              <a:buChar char="•"/>
+            </a:pPr>
+            <a:r>
+              <a:rPr lang="en-US" sz="1600" dirty="0"/>
+              <a:t>Lever press is binarized (0=small, 1=large)</a:t>
+            </a:r>
+          </a:p>
+          <a:p>
+            <a:pPr marL="285750" indent="-285750">
+              <a:buFont typeface="Arial" panose="020B0604020202020204" pitchFamily="34" charset="0"/>
+              <a:buChar char="•"/>
+            </a:pPr>
+            <a:r>
+              <a:rPr lang="en-US" sz="1600" dirty="0"/>
+              <a:t>Results in a 787 by 12 </a:t>
+            </a:r>
+            <a:r>
+              <a:rPr lang="en-US" sz="1600" dirty="0" err="1"/>
+              <a:t>dataframe</a:t>
+            </a:r>
+            <a:endParaRPr lang="en-US" sz="1600" dirty="0"/>
+          </a:p>
+          <a:p>
+            <a:pPr marL="285750" indent="-285750">
+              <a:buFont typeface="Arial" panose="020B0604020202020204" pitchFamily="34" charset="0"/>
+              <a:buChar char="•"/>
+            </a:pPr>
+            <a:r>
+              <a:rPr lang="en-US" sz="1600" dirty="0"/>
+              <a:t>Small=109, Large = 678</a:t>
+            </a:r>
+          </a:p>
+        </p:txBody>
+      </p:sp>
+      <p:pic>
+        <p:nvPicPr>
+          <p:cNvPr id="10" name="Picture 9">
+            <a:extLst>
+              <a:ext uri="{FF2B5EF4-FFF2-40B4-BE49-F238E27FC236}">
+                <a16:creationId xmlns:a16="http://schemas.microsoft.com/office/drawing/2014/main" id="{FACCD987-DD54-8578-76D6-4A71C2CD81EC}"/>
+              </a:ext>
+            </a:extLst>
+          </p:cNvPr>
+          <p:cNvPicPr>
+            <a:picLocks noChangeAspect="1"/>
+          </p:cNvPicPr>
+          <p:nvPr/>
+        </p:nvPicPr>
+        <p:blipFill>
+          <a:blip r:embed="rId3"/>
+          <a:stretch>
+            <a:fillRect/>
+          </a:stretch>
+        </p:blipFill>
+        <p:spPr>
+          <a:xfrm>
+            <a:off x="6756401" y="828948"/>
+            <a:ext cx="5248286" cy="2253865"/>
+          </a:xfrm>
+          <a:prstGeom prst="rect">
+            <a:avLst/>
+          </a:prstGeom>
+        </p:spPr>
+      </p:pic>
     </p:spTree>
     <p:extLst>
       <p:ext uri="{BB962C8B-B14F-4D97-AF65-F5344CB8AC3E}">
@@ -3600,7 +3871,7 @@
           <p:cNvPr id="2" name="TextBox 1">
             <a:extLst>
               <a:ext uri="{FF2B5EF4-FFF2-40B4-BE49-F238E27FC236}">
-                <a16:creationId xmlns:a16="http://schemas.microsoft.com/office/drawing/2014/main" id="{8C64F1EC-1BB2-757D-FE20-A6EE22C6DCC5}"/>
+                <a16:creationId xmlns:a16="http://schemas.microsoft.com/office/drawing/2014/main" id="{BE2F89AE-8E51-3844-EDEC-57291C05989D}"/>
               </a:ext>
             </a:extLst>
           </p:cNvPr>
@@ -3609,8 +3880,8 @@
         </p:nvSpPr>
         <p:spPr>
           <a:xfrm>
-            <a:off x="-1" y="0"/>
-            <a:ext cx="12191999" cy="523220"/>
+            <a:off x="0" y="0"/>
+            <a:ext cx="1686560" cy="523220"/>
           </a:xfrm>
           <a:prstGeom prst="rect">
             <a:avLst/>
@@ -3625,17 +3896,17 @@
           <a:p>
             <a:r>
               <a:rPr lang="en-US" sz="2800" dirty="0"/>
-              <a:t>Random Forest w/ SMOTE</a:t>
-            </a:r>
-          </a:p>
-        </p:txBody>
-      </p:sp>
-      <p:sp>
-        <p:nvSpPr>
-          <p:cNvPr id="5" name="TextBox 4">
-            <a:extLst>
-              <a:ext uri="{FF2B5EF4-FFF2-40B4-BE49-F238E27FC236}">
-                <a16:creationId xmlns:a16="http://schemas.microsoft.com/office/drawing/2014/main" id="{4763F35E-2BBD-DCC3-26CF-CB01E32AC0B1}"/>
+              <a:t>Input data </a:t>
+            </a:r>
+          </a:p>
+        </p:txBody>
+      </p:sp>
+      <p:sp>
+        <p:nvSpPr>
+          <p:cNvPr id="3" name="TextBox 2">
+            <a:extLst>
+              <a:ext uri="{FF2B5EF4-FFF2-40B4-BE49-F238E27FC236}">
+                <a16:creationId xmlns:a16="http://schemas.microsoft.com/office/drawing/2014/main" id="{7FAE043A-26B9-D468-4CD0-DA7485C7623B}"/>
               </a:ext>
             </a:extLst>
           </p:cNvPr>
@@ -3644,8 +3915,8 @@
         </p:nvSpPr>
         <p:spPr>
           <a:xfrm>
-            <a:off x="0" y="615553"/>
-            <a:ext cx="12191999" cy="584775"/>
+            <a:off x="0" y="1951618"/>
+            <a:ext cx="11782424" cy="3046988"/>
           </a:xfrm>
           <a:prstGeom prst="rect">
             <a:avLst/>
@@ -3658,33 +3929,174 @@
           </a:bodyPr>
           <a:lstStyle/>
           <a:p>
-            <a:r>
-              <a:rPr lang="en-US" sz="1600" dirty="0"/>
-              <a:t>Features: ['Trial#','Lever','LeverZmax','LeverZmin','LeverAUC','HLZmax','HLZmin','HLAUC','NextLever','Shock'] </a:t>
-            </a:r>
-          </a:p>
-          <a:p>
-            <a:r>
-              <a:rPr lang="en-US" sz="1600" dirty="0"/>
-              <a:t>Due to imbalance within the </a:t>
-            </a:r>
+            <a:pPr marL="285750" indent="-285750">
+              <a:buFont typeface="Arial" panose="020B0604020202020204" pitchFamily="34" charset="0"/>
+              <a:buChar char="•"/>
+            </a:pPr>
+            <a:r>
+              <a:rPr lang="en-US" sz="1600" dirty="0"/>
+              <a:t>Trial# = Trial number for free choice trials [Block 1 = 1-20, Block 2 = 21-40, Block 3 = 41-60]</a:t>
+            </a:r>
+          </a:p>
+          <a:p>
+            <a:pPr marL="285750" indent="-285750">
+              <a:buFont typeface="Arial" panose="020B0604020202020204" pitchFamily="34" charset="0"/>
+              <a:buChar char="•"/>
+            </a:pPr>
+            <a:r>
+              <a:rPr lang="en-US" sz="1600" dirty="0"/>
+              <a:t>Lever = lever selection in current trial (1 = Small, 2 = Punished, 3 = Unpunished)</a:t>
+            </a:r>
+          </a:p>
+          <a:p>
+            <a:pPr marL="285750" indent="-285750">
+              <a:buFont typeface="Arial" panose="020B0604020202020204" pitchFamily="34" charset="0"/>
+              <a:buChar char="•"/>
+            </a:pPr>
             <a:r>
               <a:rPr lang="en-US" sz="1600" dirty="0" err="1"/>
               <a:t>NextLever</a:t>
             </a:r>
             <a:r>
               <a:rPr lang="en-US" sz="1600" dirty="0"/>
-              <a:t> classes (small=179, large = 2166), I opted for Random Forest + SMOTE oversampling</a:t>
-            </a:r>
+              <a:t> = lever selected in next trial ( 0 = Omit, 1 = Small, 2 = Punished, 3 = Unpunished after binarization: 0 = Small, 1 = Large)</a:t>
+            </a:r>
+          </a:p>
+          <a:p>
+            <a:pPr marL="285750" indent="-285750">
+              <a:buFont typeface="Arial" panose="020B0604020202020204" pitchFamily="34" charset="0"/>
+              <a:buChar char="•"/>
+            </a:pPr>
+            <a:r>
+              <a:rPr lang="en-US" sz="1600" dirty="0"/>
+              <a:t>WSLS = Win-Stay/Lose-Shift code (1 = Win-Stay, 2 = Lose-Shift, 3 = Win-Shift, 4 = Lose-Stay, 9 = N/A</a:t>
+            </a:r>
+          </a:p>
+          <a:p>
+            <a:pPr marL="285750" indent="-285750">
+              <a:buFont typeface="Arial" panose="020B0604020202020204" pitchFamily="34" charset="0"/>
+              <a:buChar char="•"/>
+            </a:pPr>
+            <a:r>
+              <a:rPr lang="en-US" sz="1600" dirty="0" err="1"/>
+              <a:t>LeverZmax</a:t>
+            </a:r>
+            <a:r>
+              <a:rPr lang="en-US" sz="1600" dirty="0"/>
+              <a:t> = Z-score maximum at 1-second window after lever press </a:t>
+            </a:r>
+          </a:p>
+          <a:p>
+            <a:pPr marL="285750" indent="-285750">
+              <a:buFont typeface="Arial" panose="020B0604020202020204" pitchFamily="34" charset="0"/>
+              <a:buChar char="•"/>
+            </a:pPr>
+            <a:r>
+              <a:rPr lang="en-US" sz="1600" dirty="0" err="1"/>
+              <a:t>LeverZmin</a:t>
+            </a:r>
+            <a:r>
+              <a:rPr lang="en-US" sz="1600" dirty="0"/>
+              <a:t> = Z-score minimum at 1-second window after lever press </a:t>
+            </a:r>
+          </a:p>
+          <a:p>
+            <a:pPr marL="285750" indent="-285750">
+              <a:buFont typeface="Arial" panose="020B0604020202020204" pitchFamily="34" charset="0"/>
+              <a:buChar char="•"/>
+            </a:pPr>
+            <a:r>
+              <a:rPr lang="en-US" sz="1600" dirty="0" err="1"/>
+              <a:t>LeverAUC</a:t>
+            </a:r>
+            <a:r>
+              <a:rPr lang="en-US" sz="1600" dirty="0"/>
+              <a:t> = Area-under-the-curve for 1-second window after lever press </a:t>
+            </a:r>
+          </a:p>
+          <a:p>
+            <a:pPr marL="285750" indent="-285750">
+              <a:buFont typeface="Arial" panose="020B0604020202020204" pitchFamily="34" charset="0"/>
+              <a:buChar char="•"/>
+            </a:pPr>
+            <a:r>
+              <a:rPr lang="en-US" sz="1600" dirty="0" err="1"/>
+              <a:t>HLZmax</a:t>
+            </a:r>
+            <a:r>
+              <a:rPr lang="en-US" sz="1600" dirty="0"/>
+              <a:t> = Z-score maximum at 1-second window after </a:t>
+            </a:r>
+            <a:r>
+              <a:rPr lang="en-US" sz="1600" dirty="0" err="1"/>
+              <a:t>houselight</a:t>
+            </a:r>
+            <a:endParaRPr lang="en-US" sz="1600" dirty="0"/>
+          </a:p>
+          <a:p>
+            <a:pPr marL="285750" indent="-285750">
+              <a:buFont typeface="Arial" panose="020B0604020202020204" pitchFamily="34" charset="0"/>
+              <a:buChar char="•"/>
+            </a:pPr>
+            <a:r>
+              <a:rPr lang="en-US" sz="1600" dirty="0" err="1"/>
+              <a:t>HLZmin</a:t>
+            </a:r>
+            <a:r>
+              <a:rPr lang="en-US" sz="1600" dirty="0"/>
+              <a:t> = Z-score minimum at 1-second window after </a:t>
+            </a:r>
+            <a:r>
+              <a:rPr lang="en-US" sz="1600" dirty="0" err="1"/>
+              <a:t>houselight</a:t>
+            </a:r>
+            <a:endParaRPr lang="en-US" sz="1600" dirty="0"/>
+          </a:p>
+          <a:p>
+            <a:pPr marL="285750" indent="-285750">
+              <a:buFont typeface="Arial" panose="020B0604020202020204" pitchFamily="34" charset="0"/>
+              <a:buChar char="•"/>
+            </a:pPr>
+            <a:r>
+              <a:rPr lang="en-US" sz="1600" dirty="0"/>
+              <a:t>HLAUC = Area-under-the-curve for 1-second window after </a:t>
+            </a:r>
+            <a:r>
+              <a:rPr lang="en-US" sz="1600" dirty="0" err="1"/>
+              <a:t>houselight</a:t>
+            </a:r>
+            <a:endParaRPr lang="en-US" sz="1600" dirty="0"/>
+          </a:p>
+          <a:p>
+            <a:pPr marL="285750" indent="-285750">
+              <a:buFont typeface="Arial" panose="020B0604020202020204" pitchFamily="34" charset="0"/>
+              <a:buChar char="•"/>
+            </a:pPr>
+            <a:r>
+              <a:rPr lang="en-US" sz="1600" dirty="0"/>
+              <a:t>Shock = Shock intensity in </a:t>
+            </a:r>
+            <a:r>
+              <a:rPr lang="en-US" sz="1600" dirty="0" err="1"/>
+              <a:t>uA</a:t>
+            </a:r>
+            <a:endParaRPr lang="en-US" sz="1600" dirty="0"/>
+          </a:p>
+          <a:p>
+            <a:pPr marL="285750" indent="-285750">
+              <a:buFont typeface="Arial" panose="020B0604020202020204" pitchFamily="34" charset="0"/>
+              <a:buChar char="•"/>
+            </a:pPr>
+            <a:endParaRPr lang="en-US" sz="1600" dirty="0"/>
           </a:p>
         </p:txBody>
       </p:sp>
       <p:pic>
         <p:nvPicPr>
-          <p:cNvPr id="7" name="Picture 6">
-            <a:extLst>
-              <a:ext uri="{FF2B5EF4-FFF2-40B4-BE49-F238E27FC236}">
-                <a16:creationId xmlns:a16="http://schemas.microsoft.com/office/drawing/2014/main" id="{A4D6B3BB-4C88-EBD2-F89E-0ADBC820554D}"/>
+          <p:cNvPr id="4" name="Picture 3">
+            <a:extLst>
+              <a:ext uri="{FF2B5EF4-FFF2-40B4-BE49-F238E27FC236}">
+                <a16:creationId xmlns:a16="http://schemas.microsoft.com/office/drawing/2014/main" id="{B34836F0-603B-2A3E-51F1-B5FFCE348FCA}"/>
               </a:ext>
             </a:extLst>
           </p:cNvPr>
@@ -3693,431 +4105,15 @@
           </p:cNvPicPr>
           <p:nvPr/>
         </p:nvPicPr>
-        <p:blipFill>
+        <p:blipFill rotWithShape="1">
           <a:blip r:embed="rId2"/>
-          <a:stretch>
-            <a:fillRect/>
-          </a:stretch>
+          <a:srcRect t="-1" b="73839"/>
+          <a:stretch/>
         </p:blipFill>
         <p:spPr>
           <a:xfrm>
-            <a:off x="122782" y="1318077"/>
-            <a:ext cx="3436918" cy="2110923"/>
-          </a:xfrm>
-          <a:prstGeom prst="rect">
-            <a:avLst/>
-          </a:prstGeom>
-        </p:spPr>
-      </p:pic>
-      <p:pic>
-        <p:nvPicPr>
-          <p:cNvPr id="9" name="Picture 8">
-            <a:extLst>
-              <a:ext uri="{FF2B5EF4-FFF2-40B4-BE49-F238E27FC236}">
-                <a16:creationId xmlns:a16="http://schemas.microsoft.com/office/drawing/2014/main" id="{12AD28AA-227F-DE35-0510-70BF5089E653}"/>
-              </a:ext>
-            </a:extLst>
-          </p:cNvPr>
-          <p:cNvPicPr>
-            <a:picLocks noChangeAspect="1"/>
-          </p:cNvPicPr>
-          <p:nvPr/>
-        </p:nvPicPr>
-        <p:blipFill>
-          <a:blip r:embed="rId3"/>
-          <a:stretch>
-            <a:fillRect/>
-          </a:stretch>
-        </p:blipFill>
-        <p:spPr>
-          <a:xfrm>
-            <a:off x="3642048" y="1318077"/>
-            <a:ext cx="2712099" cy="2113274"/>
-          </a:xfrm>
-          <a:prstGeom prst="rect">
-            <a:avLst/>
-          </a:prstGeom>
-          <a:ln>
-            <a:solidFill>
-              <a:schemeClr val="tx1"/>
-            </a:solidFill>
-          </a:ln>
-        </p:spPr>
-      </p:pic>
-      <p:pic>
-        <p:nvPicPr>
-          <p:cNvPr id="11" name="Picture 10">
-            <a:extLst>
-              <a:ext uri="{FF2B5EF4-FFF2-40B4-BE49-F238E27FC236}">
-                <a16:creationId xmlns:a16="http://schemas.microsoft.com/office/drawing/2014/main" id="{C6F3EE12-9E96-D2BA-78A7-E913AA00C6BD}"/>
-              </a:ext>
-            </a:extLst>
-          </p:cNvPr>
-          <p:cNvPicPr>
-            <a:picLocks noChangeAspect="1"/>
-          </p:cNvPicPr>
-          <p:nvPr/>
-        </p:nvPicPr>
-        <p:blipFill>
-          <a:blip r:embed="rId4"/>
-          <a:stretch>
-            <a:fillRect/>
-          </a:stretch>
-        </p:blipFill>
-        <p:spPr>
-          <a:xfrm>
-            <a:off x="6436495" y="1318077"/>
-            <a:ext cx="2953910" cy="2110923"/>
-          </a:xfrm>
-          <a:prstGeom prst="rect">
-            <a:avLst/>
-          </a:prstGeom>
-          <a:ln>
-            <a:solidFill>
-              <a:schemeClr val="tx1"/>
-            </a:solidFill>
-          </a:ln>
-        </p:spPr>
-      </p:pic>
-      <p:pic>
-        <p:nvPicPr>
-          <p:cNvPr id="13" name="Picture 12">
-            <a:extLst>
-              <a:ext uri="{FF2B5EF4-FFF2-40B4-BE49-F238E27FC236}">
-                <a16:creationId xmlns:a16="http://schemas.microsoft.com/office/drawing/2014/main" id="{2BFD1B95-530F-4660-DC83-21BB596702E9}"/>
-              </a:ext>
-            </a:extLst>
-          </p:cNvPr>
-          <p:cNvPicPr>
-            <a:picLocks noChangeAspect="1"/>
-          </p:cNvPicPr>
-          <p:nvPr/>
-        </p:nvPicPr>
-        <p:blipFill>
-          <a:blip r:embed="rId5"/>
-          <a:stretch>
-            <a:fillRect/>
-          </a:stretch>
-        </p:blipFill>
-        <p:spPr>
-          <a:xfrm>
-            <a:off x="151307" y="3546750"/>
-            <a:ext cx="2070057" cy="1725048"/>
-          </a:xfrm>
-          <a:prstGeom prst="rect">
-            <a:avLst/>
-          </a:prstGeom>
-          <a:ln>
-            <a:solidFill>
-              <a:schemeClr val="tx1"/>
-            </a:solidFill>
-          </a:ln>
-        </p:spPr>
-      </p:pic>
-      <p:pic>
-        <p:nvPicPr>
-          <p:cNvPr id="15" name="Picture 14">
-            <a:extLst>
-              <a:ext uri="{FF2B5EF4-FFF2-40B4-BE49-F238E27FC236}">
-                <a16:creationId xmlns:a16="http://schemas.microsoft.com/office/drawing/2014/main" id="{F05FE7D0-CAC1-F329-0891-6B87F6ABB447}"/>
-              </a:ext>
-            </a:extLst>
-          </p:cNvPr>
-          <p:cNvPicPr>
-            <a:picLocks noChangeAspect="1"/>
-          </p:cNvPicPr>
-          <p:nvPr/>
-        </p:nvPicPr>
-        <p:blipFill>
-          <a:blip r:embed="rId6"/>
-          <a:stretch>
-            <a:fillRect/>
-          </a:stretch>
-        </p:blipFill>
-        <p:spPr>
-          <a:xfrm>
-            <a:off x="2274104" y="3546750"/>
-            <a:ext cx="2037712" cy="1725047"/>
-          </a:xfrm>
-          <a:prstGeom prst="rect">
-            <a:avLst/>
-          </a:prstGeom>
-          <a:ln>
-            <a:solidFill>
-              <a:schemeClr val="tx1"/>
-            </a:solidFill>
-          </a:ln>
-        </p:spPr>
-      </p:pic>
-      <p:pic>
-        <p:nvPicPr>
-          <p:cNvPr id="17" name="Picture 16">
-            <a:extLst>
-              <a:ext uri="{FF2B5EF4-FFF2-40B4-BE49-F238E27FC236}">
-                <a16:creationId xmlns:a16="http://schemas.microsoft.com/office/drawing/2014/main" id="{EE4A3449-3F4C-8CDE-61C1-4DA9D83172D1}"/>
-              </a:ext>
-            </a:extLst>
-          </p:cNvPr>
-          <p:cNvPicPr>
-            <a:picLocks noChangeAspect="1"/>
-          </p:cNvPicPr>
-          <p:nvPr/>
-        </p:nvPicPr>
-        <p:blipFill>
-          <a:blip r:embed="rId7"/>
-          <a:stretch>
-            <a:fillRect/>
-          </a:stretch>
-        </p:blipFill>
-        <p:spPr>
-          <a:xfrm>
-            <a:off x="4375254" y="3546750"/>
-            <a:ext cx="2070057" cy="1725048"/>
-          </a:xfrm>
-          <a:prstGeom prst="rect">
-            <a:avLst/>
-          </a:prstGeom>
-          <a:ln>
-            <a:solidFill>
-              <a:schemeClr val="tx1"/>
-            </a:solidFill>
-          </a:ln>
-        </p:spPr>
-      </p:pic>
-      <p:pic>
-        <p:nvPicPr>
-          <p:cNvPr id="19" name="Picture 18">
-            <a:extLst>
-              <a:ext uri="{FF2B5EF4-FFF2-40B4-BE49-F238E27FC236}">
-                <a16:creationId xmlns:a16="http://schemas.microsoft.com/office/drawing/2014/main" id="{76B20AB3-11FC-5F28-3AD8-3ECB802F4092}"/>
-              </a:ext>
-            </a:extLst>
-          </p:cNvPr>
-          <p:cNvPicPr>
-            <a:picLocks noChangeAspect="1"/>
-          </p:cNvPicPr>
-          <p:nvPr/>
-        </p:nvPicPr>
-        <p:blipFill>
-          <a:blip r:embed="rId8"/>
-          <a:stretch>
-            <a:fillRect/>
-          </a:stretch>
-        </p:blipFill>
-        <p:spPr>
-          <a:xfrm>
-            <a:off x="6538392" y="3546750"/>
-            <a:ext cx="2070057" cy="1725048"/>
-          </a:xfrm>
-          <a:prstGeom prst="rect">
-            <a:avLst/>
-          </a:prstGeom>
-          <a:ln>
-            <a:solidFill>
-              <a:schemeClr val="tx1"/>
-            </a:solidFill>
-          </a:ln>
-        </p:spPr>
-      </p:pic>
-      <p:pic>
-        <p:nvPicPr>
-          <p:cNvPr id="21" name="Picture 20">
-            <a:extLst>
-              <a:ext uri="{FF2B5EF4-FFF2-40B4-BE49-F238E27FC236}">
-                <a16:creationId xmlns:a16="http://schemas.microsoft.com/office/drawing/2014/main" id="{76DCCE0F-434D-74C9-3C85-242E4A4C865F}"/>
-              </a:ext>
-            </a:extLst>
-          </p:cNvPr>
-          <p:cNvPicPr>
-            <a:picLocks noChangeAspect="1"/>
-          </p:cNvPicPr>
-          <p:nvPr/>
-        </p:nvPicPr>
-        <p:blipFill>
-          <a:blip r:embed="rId9"/>
-          <a:stretch>
-            <a:fillRect/>
-          </a:stretch>
-        </p:blipFill>
-        <p:spPr>
-          <a:xfrm>
-            <a:off x="8701530" y="3546749"/>
-            <a:ext cx="2070057" cy="1725048"/>
-          </a:xfrm>
-          <a:prstGeom prst="rect">
-            <a:avLst/>
-          </a:prstGeom>
-          <a:ln>
-            <a:solidFill>
-              <a:schemeClr val="tx1"/>
-            </a:solidFill>
-          </a:ln>
-        </p:spPr>
-      </p:pic>
-      <p:pic>
-        <p:nvPicPr>
-          <p:cNvPr id="23" name="Picture 22">
-            <a:extLst>
-              <a:ext uri="{FF2B5EF4-FFF2-40B4-BE49-F238E27FC236}">
-                <a16:creationId xmlns:a16="http://schemas.microsoft.com/office/drawing/2014/main" id="{534EF11D-E64D-D37D-49B4-433D751C346D}"/>
-              </a:ext>
-            </a:extLst>
-          </p:cNvPr>
-          <p:cNvPicPr>
-            <a:picLocks noChangeAspect="1"/>
-          </p:cNvPicPr>
-          <p:nvPr/>
-        </p:nvPicPr>
-        <p:blipFill>
-          <a:blip r:embed="rId10"/>
-          <a:stretch>
-            <a:fillRect/>
-          </a:stretch>
-        </p:blipFill>
-        <p:spPr>
-          <a:xfrm>
-            <a:off x="151307" y="5379923"/>
-            <a:ext cx="2070057" cy="1725048"/>
-          </a:xfrm>
-          <a:prstGeom prst="rect">
-            <a:avLst/>
-          </a:prstGeom>
-          <a:ln>
-            <a:solidFill>
-              <a:schemeClr val="tx1"/>
-            </a:solidFill>
-          </a:ln>
-        </p:spPr>
-      </p:pic>
-      <p:pic>
-        <p:nvPicPr>
-          <p:cNvPr id="25" name="Picture 24">
-            <a:extLst>
-              <a:ext uri="{FF2B5EF4-FFF2-40B4-BE49-F238E27FC236}">
-                <a16:creationId xmlns:a16="http://schemas.microsoft.com/office/drawing/2014/main" id="{CC99607A-650C-8910-23E2-C54389B30435}"/>
-              </a:ext>
-            </a:extLst>
-          </p:cNvPr>
-          <p:cNvPicPr>
-            <a:picLocks noChangeAspect="1"/>
-          </p:cNvPicPr>
-          <p:nvPr/>
-        </p:nvPicPr>
-        <p:blipFill>
-          <a:blip r:embed="rId11"/>
-          <a:stretch>
-            <a:fillRect/>
-          </a:stretch>
-        </p:blipFill>
-        <p:spPr>
-          <a:xfrm>
-            <a:off x="2274104" y="5352199"/>
-            <a:ext cx="2070057" cy="1725048"/>
-          </a:xfrm>
-          <a:prstGeom prst="rect">
-            <a:avLst/>
-          </a:prstGeom>
-          <a:ln>
-            <a:solidFill>
-              <a:schemeClr val="tx1"/>
-            </a:solidFill>
-          </a:ln>
-        </p:spPr>
-      </p:pic>
-      <p:pic>
-        <p:nvPicPr>
-          <p:cNvPr id="27" name="Picture 26">
-            <a:extLst>
-              <a:ext uri="{FF2B5EF4-FFF2-40B4-BE49-F238E27FC236}">
-                <a16:creationId xmlns:a16="http://schemas.microsoft.com/office/drawing/2014/main" id="{271EFAA1-5A37-9E62-26F3-477F16961E10}"/>
-              </a:ext>
-            </a:extLst>
-          </p:cNvPr>
-          <p:cNvPicPr>
-            <a:picLocks noChangeAspect="1"/>
-          </p:cNvPicPr>
-          <p:nvPr/>
-        </p:nvPicPr>
-        <p:blipFill>
-          <a:blip r:embed="rId12"/>
-          <a:stretch>
-            <a:fillRect/>
-          </a:stretch>
-        </p:blipFill>
-        <p:spPr>
-          <a:xfrm>
-            <a:off x="4396901" y="5352199"/>
-            <a:ext cx="2070057" cy="1725048"/>
-          </a:xfrm>
-          <a:prstGeom prst="rect">
-            <a:avLst/>
-          </a:prstGeom>
-          <a:ln>
-            <a:solidFill>
-              <a:schemeClr val="tx1"/>
-            </a:solidFill>
-          </a:ln>
-        </p:spPr>
-      </p:pic>
-      <p:pic>
-        <p:nvPicPr>
-          <p:cNvPr id="29" name="Picture 28">
-            <a:extLst>
-              <a:ext uri="{FF2B5EF4-FFF2-40B4-BE49-F238E27FC236}">
-                <a16:creationId xmlns:a16="http://schemas.microsoft.com/office/drawing/2014/main" id="{88FA5E9B-3433-31AF-A923-7400787AE724}"/>
-              </a:ext>
-            </a:extLst>
-          </p:cNvPr>
-          <p:cNvPicPr>
-            <a:picLocks noChangeAspect="1"/>
-          </p:cNvPicPr>
-          <p:nvPr/>
-        </p:nvPicPr>
-        <p:blipFill>
-          <a:blip r:embed="rId13"/>
-          <a:stretch>
-            <a:fillRect/>
-          </a:stretch>
-        </p:blipFill>
-        <p:spPr>
-          <a:xfrm>
-            <a:off x="6538392" y="5352200"/>
-            <a:ext cx="2037712" cy="1725047"/>
-          </a:xfrm>
-          <a:prstGeom prst="rect">
-            <a:avLst/>
-          </a:prstGeom>
-          <a:ln>
-            <a:solidFill>
-              <a:schemeClr val="tx1"/>
-            </a:solidFill>
-          </a:ln>
-        </p:spPr>
-      </p:pic>
-      <p:pic>
-        <p:nvPicPr>
-          <p:cNvPr id="31" name="Picture 30">
-            <a:extLst>
-              <a:ext uri="{FF2B5EF4-FFF2-40B4-BE49-F238E27FC236}">
-                <a16:creationId xmlns:a16="http://schemas.microsoft.com/office/drawing/2014/main" id="{7C9F9210-8736-15CF-ACEC-3BD7DF0172D4}"/>
-              </a:ext>
-            </a:extLst>
-          </p:cNvPr>
-          <p:cNvPicPr>
-            <a:picLocks noChangeAspect="1"/>
-          </p:cNvPicPr>
-          <p:nvPr/>
-        </p:nvPicPr>
-        <p:blipFill>
-          <a:blip r:embed="rId14"/>
-          <a:stretch>
-            <a:fillRect/>
-          </a:stretch>
-        </p:blipFill>
-        <p:spPr>
-          <a:xfrm>
-            <a:off x="8701530" y="5369996"/>
-            <a:ext cx="2668555" cy="1707251"/>
+            <a:off x="108927" y="661862"/>
+            <a:ext cx="11673497" cy="1151114"/>
           </a:xfrm>
           <a:prstGeom prst="rect">
             <a:avLst/>
@@ -4127,7 +4123,7 @@
     </p:spTree>
     <p:extLst>
       <p:ext uri="{BB962C8B-B14F-4D97-AF65-F5344CB8AC3E}">
-        <p14:creationId xmlns:p14="http://schemas.microsoft.com/office/powerpoint/2010/main" val="430772491"/>
+        <p14:creationId xmlns:p14="http://schemas.microsoft.com/office/powerpoint/2010/main" val="4027714010"/>
       </p:ext>
     </p:extLst>
   </p:cSld>
@@ -4154,128 +4150,12 @@
           <a:chExt cx="0" cy="0"/>
         </a:xfrm>
       </p:grpSpPr>
-      <p:sp>
-        <p:nvSpPr>
-          <p:cNvPr id="2" name="TextBox 1">
-            <a:extLst>
-              <a:ext uri="{FF2B5EF4-FFF2-40B4-BE49-F238E27FC236}">
-                <a16:creationId xmlns:a16="http://schemas.microsoft.com/office/drawing/2014/main" id="{8C64F1EC-1BB2-757D-FE20-A6EE22C6DCC5}"/>
-              </a:ext>
-            </a:extLst>
-          </p:cNvPr>
-          <p:cNvSpPr txBox="1"/>
-          <p:nvPr/>
-        </p:nvSpPr>
-        <p:spPr>
-          <a:xfrm>
-            <a:off x="-1" y="0"/>
-            <a:ext cx="12191999" cy="523220"/>
-          </a:xfrm>
-          <a:prstGeom prst="rect">
-            <a:avLst/>
-          </a:prstGeom>
-          <a:noFill/>
-        </p:spPr>
-        <p:txBody>
-          <a:bodyPr wrap="square" rtlCol="0">
-            <a:spAutoFit/>
-          </a:bodyPr>
-          <a:lstStyle/>
-          <a:p>
-            <a:r>
-              <a:rPr lang="en-US" sz="2800" dirty="0"/>
-              <a:t>Random Forest w</a:t>
-            </a:r>
-            <a:r>
-              <a:rPr lang="en-US" sz="2800"/>
-              <a:t>/ manual resampling </a:t>
-            </a:r>
-            <a:r>
-              <a:rPr lang="en-US" sz="2800" dirty="0"/>
-              <a:t>to minority class</a:t>
-            </a:r>
-          </a:p>
-        </p:txBody>
-      </p:sp>
-      <p:sp>
-        <p:nvSpPr>
-          <p:cNvPr id="5" name="TextBox 4">
-            <a:extLst>
-              <a:ext uri="{FF2B5EF4-FFF2-40B4-BE49-F238E27FC236}">
-                <a16:creationId xmlns:a16="http://schemas.microsoft.com/office/drawing/2014/main" id="{4763F35E-2BBD-DCC3-26CF-CB01E32AC0B1}"/>
-              </a:ext>
-            </a:extLst>
-          </p:cNvPr>
-          <p:cNvSpPr txBox="1"/>
-          <p:nvPr/>
-        </p:nvSpPr>
-        <p:spPr>
-          <a:xfrm>
-            <a:off x="0" y="615553"/>
-            <a:ext cx="12191999" cy="584775"/>
-          </a:xfrm>
-          <a:prstGeom prst="rect">
-            <a:avLst/>
-          </a:prstGeom>
-          <a:noFill/>
-        </p:spPr>
-        <p:txBody>
-          <a:bodyPr wrap="square" rtlCol="0">
-            <a:spAutoFit/>
-          </a:bodyPr>
-          <a:lstStyle/>
-          <a:p>
-            <a:r>
-              <a:rPr lang="en-US" sz="1600" dirty="0"/>
-              <a:t>Features: ['Trial#','Lever','LeverZmax','LeverZmin','LeverAUC','HLZmax','HLZmin','HLAUC','NextLever','Shock'] </a:t>
-            </a:r>
-          </a:p>
-          <a:p>
-            <a:r>
-              <a:rPr lang="en-US" sz="1600" dirty="0"/>
-              <a:t>Due to imbalance within the </a:t>
-            </a:r>
-            <a:r>
-              <a:rPr lang="en-US" sz="1600" dirty="0" err="1"/>
-              <a:t>NextLever</a:t>
-            </a:r>
-            <a:r>
-              <a:rPr lang="en-US" sz="1600" dirty="0"/>
-              <a:t> classes (small=179, large = 2166), I </a:t>
-            </a:r>
-            <a:r>
-              <a:rPr lang="en-US" sz="1600" dirty="0" err="1"/>
-              <a:t>downsampled</a:t>
-            </a:r>
-            <a:r>
-              <a:rPr lang="en-US" sz="1600" dirty="0"/>
-              <a:t> </a:t>
-            </a:r>
-            <a:r>
-              <a:rPr lang="en-US" sz="1600" dirty="0" err="1"/>
-              <a:t>NextLever</a:t>
-            </a:r>
-            <a:r>
-              <a:rPr lang="en-US" sz="1600" dirty="0"/>
-              <a:t>=1 to be the size of </a:t>
-            </a:r>
-            <a:r>
-              <a:rPr lang="en-US" sz="1600" dirty="0" err="1"/>
-              <a:t>NextLever</a:t>
-            </a:r>
-            <a:r>
-              <a:rPr lang="en-US" sz="1600" dirty="0"/>
-              <a:t>=0 (179)</a:t>
-            </a:r>
-          </a:p>
-        </p:txBody>
-      </p:sp>
       <p:pic>
         <p:nvPicPr>
-          <p:cNvPr id="4" name="Picture 3">
-            <a:extLst>
-              <a:ext uri="{FF2B5EF4-FFF2-40B4-BE49-F238E27FC236}">
-                <a16:creationId xmlns:a16="http://schemas.microsoft.com/office/drawing/2014/main" id="{61ED0A8E-2E00-5C62-01D2-792607E1D0A6}"/>
+          <p:cNvPr id="2" name="Picture 1">
+            <a:extLst>
+              <a:ext uri="{FF2B5EF4-FFF2-40B4-BE49-F238E27FC236}">
+                <a16:creationId xmlns:a16="http://schemas.microsoft.com/office/drawing/2014/main" id="{B7F124A6-F2CF-15FB-9B98-1F35706C6A23}"/>
               </a:ext>
             </a:extLst>
           </p:cNvPr>
@@ -4292,423 +4172,230 @@
         </p:blipFill>
         <p:spPr>
           <a:xfrm>
-            <a:off x="177055" y="1200328"/>
-            <a:ext cx="3421677" cy="2088061"/>
+            <a:off x="0" y="145295"/>
+            <a:ext cx="7394938" cy="6567410"/>
           </a:xfrm>
           <a:prstGeom prst="rect">
             <a:avLst/>
           </a:prstGeom>
         </p:spPr>
       </p:pic>
-      <p:pic>
-        <p:nvPicPr>
-          <p:cNvPr id="8" name="Picture 7">
-            <a:extLst>
-              <a:ext uri="{FF2B5EF4-FFF2-40B4-BE49-F238E27FC236}">
-                <a16:creationId xmlns:a16="http://schemas.microsoft.com/office/drawing/2014/main" id="{DE0F9680-94AE-0F81-CC53-80F8F7EF1C0C}"/>
-              </a:ext>
-            </a:extLst>
-          </p:cNvPr>
-          <p:cNvPicPr>
-            <a:picLocks noChangeAspect="1"/>
-          </p:cNvPicPr>
-          <p:nvPr/>
-        </p:nvPicPr>
-        <p:blipFill>
-          <a:blip r:embed="rId3"/>
-          <a:stretch>
-            <a:fillRect/>
-          </a:stretch>
-        </p:blipFill>
-        <p:spPr>
-          <a:xfrm>
-            <a:off x="3775787" y="1200328"/>
-            <a:ext cx="2679742" cy="2088061"/>
-          </a:xfrm>
-          <a:prstGeom prst="rect">
-            <a:avLst/>
-          </a:prstGeom>
-        </p:spPr>
-      </p:pic>
-      <p:pic>
-        <p:nvPicPr>
-          <p:cNvPr id="12" name="Picture 11">
-            <a:extLst>
-              <a:ext uri="{FF2B5EF4-FFF2-40B4-BE49-F238E27FC236}">
-                <a16:creationId xmlns:a16="http://schemas.microsoft.com/office/drawing/2014/main" id="{3E804412-1CF8-3183-718A-F7C07B6D1C22}"/>
-              </a:ext>
-            </a:extLst>
-          </p:cNvPr>
-          <p:cNvPicPr>
-            <a:picLocks noChangeAspect="1"/>
-          </p:cNvPicPr>
-          <p:nvPr/>
-        </p:nvPicPr>
-        <p:blipFill>
-          <a:blip r:embed="rId4"/>
-          <a:stretch>
-            <a:fillRect/>
-          </a:stretch>
-        </p:blipFill>
-        <p:spPr>
-          <a:xfrm>
-            <a:off x="6632584" y="1200329"/>
-            <a:ext cx="2679743" cy="1914998"/>
-          </a:xfrm>
-          <a:prstGeom prst="rect">
-            <a:avLst/>
-          </a:prstGeom>
-        </p:spPr>
-      </p:pic>
-      <p:pic>
-        <p:nvPicPr>
-          <p:cNvPr id="16" name="Picture 15">
-            <a:extLst>
-              <a:ext uri="{FF2B5EF4-FFF2-40B4-BE49-F238E27FC236}">
-                <a16:creationId xmlns:a16="http://schemas.microsoft.com/office/drawing/2014/main" id="{04D379BB-0D6F-C7F6-882B-F05C3445EF6B}"/>
-              </a:ext>
-            </a:extLst>
-          </p:cNvPr>
-          <p:cNvPicPr>
-            <a:picLocks noChangeAspect="1"/>
-          </p:cNvPicPr>
-          <p:nvPr/>
-        </p:nvPicPr>
-        <p:blipFill>
-          <a:blip r:embed="rId5"/>
-          <a:stretch>
-            <a:fillRect/>
-          </a:stretch>
-        </p:blipFill>
-        <p:spPr>
-          <a:xfrm>
-            <a:off x="110395" y="3429000"/>
-            <a:ext cx="1822704" cy="1518920"/>
-          </a:xfrm>
-          <a:prstGeom prst="rect">
-            <a:avLst/>
-          </a:prstGeom>
-          <a:ln>
-            <a:solidFill>
-              <a:schemeClr val="tx1"/>
-            </a:solidFill>
-          </a:ln>
-        </p:spPr>
-      </p:pic>
-      <p:pic>
-        <p:nvPicPr>
-          <p:cNvPr id="20" name="Picture 19">
-            <a:extLst>
-              <a:ext uri="{FF2B5EF4-FFF2-40B4-BE49-F238E27FC236}">
-                <a16:creationId xmlns:a16="http://schemas.microsoft.com/office/drawing/2014/main" id="{FE88A9D2-D499-2495-D079-4F1B0013B6F1}"/>
-              </a:ext>
-            </a:extLst>
-          </p:cNvPr>
-          <p:cNvPicPr>
-            <a:picLocks noChangeAspect="1"/>
-          </p:cNvPicPr>
-          <p:nvPr/>
-        </p:nvPicPr>
-        <p:blipFill>
-          <a:blip r:embed="rId6"/>
-          <a:stretch>
-            <a:fillRect/>
-          </a:stretch>
-        </p:blipFill>
-        <p:spPr>
-          <a:xfrm>
-            <a:off x="2015344" y="3429000"/>
-            <a:ext cx="1794224" cy="1518920"/>
-          </a:xfrm>
-          <a:prstGeom prst="rect">
-            <a:avLst/>
-          </a:prstGeom>
-          <a:ln>
-            <a:solidFill>
-              <a:schemeClr val="tx1"/>
-            </a:solidFill>
-          </a:ln>
-        </p:spPr>
-      </p:pic>
-      <p:pic>
-        <p:nvPicPr>
-          <p:cNvPr id="24" name="Picture 23">
-            <a:extLst>
-              <a:ext uri="{FF2B5EF4-FFF2-40B4-BE49-F238E27FC236}">
-                <a16:creationId xmlns:a16="http://schemas.microsoft.com/office/drawing/2014/main" id="{CF14F75F-E012-3D56-AA7C-BC252A3F7FBF}"/>
-              </a:ext>
-            </a:extLst>
-          </p:cNvPr>
-          <p:cNvPicPr>
-            <a:picLocks noChangeAspect="1"/>
-          </p:cNvPicPr>
-          <p:nvPr/>
-        </p:nvPicPr>
-        <p:blipFill>
-          <a:blip r:embed="rId7"/>
-          <a:stretch>
-            <a:fillRect/>
-          </a:stretch>
-        </p:blipFill>
-        <p:spPr>
-          <a:xfrm>
-            <a:off x="3898099" y="3429000"/>
-            <a:ext cx="1848019" cy="1518920"/>
-          </a:xfrm>
-          <a:prstGeom prst="rect">
-            <a:avLst/>
-          </a:prstGeom>
-          <a:ln>
-            <a:solidFill>
-              <a:schemeClr val="tx1"/>
-            </a:solidFill>
-          </a:ln>
-        </p:spPr>
-      </p:pic>
-      <p:pic>
-        <p:nvPicPr>
-          <p:cNvPr id="28" name="Picture 27">
-            <a:extLst>
-              <a:ext uri="{FF2B5EF4-FFF2-40B4-BE49-F238E27FC236}">
-                <a16:creationId xmlns:a16="http://schemas.microsoft.com/office/drawing/2014/main" id="{68E6FA8C-CA6C-441B-1FCE-000BE208C9D8}"/>
-              </a:ext>
-            </a:extLst>
-          </p:cNvPr>
-          <p:cNvPicPr>
-            <a:picLocks noChangeAspect="1"/>
-          </p:cNvPicPr>
-          <p:nvPr/>
-        </p:nvPicPr>
-        <p:blipFill>
-          <a:blip r:embed="rId8"/>
-          <a:stretch>
-            <a:fillRect/>
-          </a:stretch>
-        </p:blipFill>
-        <p:spPr>
-          <a:xfrm>
-            <a:off x="5830214" y="3429000"/>
-            <a:ext cx="1822704" cy="1518920"/>
-          </a:xfrm>
-          <a:prstGeom prst="rect">
-            <a:avLst/>
-          </a:prstGeom>
-          <a:ln>
-            <a:solidFill>
-              <a:schemeClr val="tx1"/>
-            </a:solidFill>
-          </a:ln>
-        </p:spPr>
-      </p:pic>
-      <p:pic>
-        <p:nvPicPr>
-          <p:cNvPr id="32" name="Picture 31">
-            <a:extLst>
-              <a:ext uri="{FF2B5EF4-FFF2-40B4-BE49-F238E27FC236}">
-                <a16:creationId xmlns:a16="http://schemas.microsoft.com/office/drawing/2014/main" id="{835A2D16-7E15-F550-A78B-2D0361AB7205}"/>
-              </a:ext>
-            </a:extLst>
-          </p:cNvPr>
-          <p:cNvPicPr>
-            <a:picLocks noChangeAspect="1"/>
-          </p:cNvPicPr>
-          <p:nvPr/>
-        </p:nvPicPr>
-        <p:blipFill>
-          <a:blip r:embed="rId9"/>
-          <a:stretch>
-            <a:fillRect/>
-          </a:stretch>
-        </p:blipFill>
-        <p:spPr>
-          <a:xfrm>
-            <a:off x="7737014" y="3429000"/>
-            <a:ext cx="1822704" cy="1518920"/>
-          </a:xfrm>
-          <a:prstGeom prst="rect">
-            <a:avLst/>
-          </a:prstGeom>
-          <a:ln>
-            <a:solidFill>
-              <a:schemeClr val="tx1"/>
-            </a:solidFill>
-          </a:ln>
-        </p:spPr>
-      </p:pic>
-      <p:pic>
-        <p:nvPicPr>
-          <p:cNvPr id="34" name="Picture 33">
-            <a:extLst>
-              <a:ext uri="{FF2B5EF4-FFF2-40B4-BE49-F238E27FC236}">
-                <a16:creationId xmlns:a16="http://schemas.microsoft.com/office/drawing/2014/main" id="{4606421B-32E3-6F76-0948-4E74029B74C4}"/>
-              </a:ext>
-            </a:extLst>
-          </p:cNvPr>
-          <p:cNvPicPr>
-            <a:picLocks noChangeAspect="1"/>
-          </p:cNvPicPr>
-          <p:nvPr/>
-        </p:nvPicPr>
-        <p:blipFill>
-          <a:blip r:embed="rId10"/>
-          <a:stretch>
-            <a:fillRect/>
-          </a:stretch>
-        </p:blipFill>
-        <p:spPr>
-          <a:xfrm>
-            <a:off x="65189" y="5176520"/>
-            <a:ext cx="1822704" cy="1518920"/>
-          </a:xfrm>
-          <a:prstGeom prst="rect">
-            <a:avLst/>
-          </a:prstGeom>
-          <a:ln>
-            <a:solidFill>
-              <a:schemeClr val="tx1"/>
-            </a:solidFill>
-          </a:ln>
-        </p:spPr>
-      </p:pic>
-      <p:pic>
-        <p:nvPicPr>
-          <p:cNvPr id="36" name="Picture 35">
-            <a:extLst>
-              <a:ext uri="{FF2B5EF4-FFF2-40B4-BE49-F238E27FC236}">
-                <a16:creationId xmlns:a16="http://schemas.microsoft.com/office/drawing/2014/main" id="{8295041D-F13C-092D-CA1D-1ABD09634E30}"/>
-              </a:ext>
-            </a:extLst>
-          </p:cNvPr>
-          <p:cNvPicPr>
-            <a:picLocks noChangeAspect="1"/>
-          </p:cNvPicPr>
-          <p:nvPr/>
-        </p:nvPicPr>
-        <p:blipFill>
-          <a:blip r:embed="rId11"/>
-          <a:stretch>
-            <a:fillRect/>
-          </a:stretch>
-        </p:blipFill>
-        <p:spPr>
-          <a:xfrm>
-            <a:off x="1986864" y="5176520"/>
-            <a:ext cx="1822704" cy="1518920"/>
-          </a:xfrm>
-          <a:prstGeom prst="rect">
-            <a:avLst/>
-          </a:prstGeom>
-          <a:ln>
-            <a:solidFill>
-              <a:schemeClr val="tx1"/>
-            </a:solidFill>
-          </a:ln>
-        </p:spPr>
-      </p:pic>
-      <p:pic>
-        <p:nvPicPr>
-          <p:cNvPr id="38" name="Picture 37">
-            <a:extLst>
-              <a:ext uri="{FF2B5EF4-FFF2-40B4-BE49-F238E27FC236}">
-                <a16:creationId xmlns:a16="http://schemas.microsoft.com/office/drawing/2014/main" id="{7DBAD0EE-36CB-54AC-323C-A4E295934A80}"/>
-              </a:ext>
-            </a:extLst>
-          </p:cNvPr>
-          <p:cNvPicPr>
-            <a:picLocks noChangeAspect="1"/>
-          </p:cNvPicPr>
-          <p:nvPr/>
-        </p:nvPicPr>
-        <p:blipFill>
-          <a:blip r:embed="rId12"/>
-          <a:stretch>
-            <a:fillRect/>
-          </a:stretch>
-        </p:blipFill>
-        <p:spPr>
-          <a:xfrm>
-            <a:off x="3908539" y="5176520"/>
-            <a:ext cx="1822704" cy="1518920"/>
-          </a:xfrm>
-          <a:prstGeom prst="rect">
-            <a:avLst/>
-          </a:prstGeom>
-          <a:ln>
-            <a:solidFill>
-              <a:schemeClr val="tx1"/>
-            </a:solidFill>
-          </a:ln>
-        </p:spPr>
-      </p:pic>
-      <p:pic>
-        <p:nvPicPr>
-          <p:cNvPr id="40" name="Picture 39">
-            <a:extLst>
-              <a:ext uri="{FF2B5EF4-FFF2-40B4-BE49-F238E27FC236}">
-                <a16:creationId xmlns:a16="http://schemas.microsoft.com/office/drawing/2014/main" id="{3AD5397E-D8B4-9B9B-F7D1-82A9B6A415DA}"/>
-              </a:ext>
-            </a:extLst>
-          </p:cNvPr>
-          <p:cNvPicPr>
-            <a:picLocks noChangeAspect="1"/>
-          </p:cNvPicPr>
-          <p:nvPr/>
-        </p:nvPicPr>
-        <p:blipFill>
-          <a:blip r:embed="rId13"/>
-          <a:stretch>
-            <a:fillRect/>
-          </a:stretch>
-        </p:blipFill>
-        <p:spPr>
-          <a:xfrm>
-            <a:off x="5830214" y="5176520"/>
-            <a:ext cx="1848019" cy="1518920"/>
-          </a:xfrm>
-          <a:prstGeom prst="rect">
-            <a:avLst/>
-          </a:prstGeom>
-          <a:ln>
-            <a:solidFill>
-              <a:schemeClr val="tx1"/>
-            </a:solidFill>
-          </a:ln>
-        </p:spPr>
-      </p:pic>
-      <p:pic>
-        <p:nvPicPr>
-          <p:cNvPr id="42" name="Picture 41">
-            <a:extLst>
-              <a:ext uri="{FF2B5EF4-FFF2-40B4-BE49-F238E27FC236}">
-                <a16:creationId xmlns:a16="http://schemas.microsoft.com/office/drawing/2014/main" id="{7023A9CB-2305-6714-7379-F17A45B420B1}"/>
-              </a:ext>
-            </a:extLst>
-          </p:cNvPr>
-          <p:cNvPicPr>
-            <a:picLocks noChangeAspect="1"/>
-          </p:cNvPicPr>
-          <p:nvPr/>
-        </p:nvPicPr>
-        <p:blipFill>
-          <a:blip r:embed="rId14"/>
-          <a:stretch>
-            <a:fillRect/>
-          </a:stretch>
-        </p:blipFill>
-        <p:spPr>
-          <a:xfrm>
-            <a:off x="7777205" y="5176520"/>
-            <a:ext cx="2427932" cy="1538909"/>
-          </a:xfrm>
-          <a:prstGeom prst="rect">
-            <a:avLst/>
-          </a:prstGeom>
-        </p:spPr>
-      </p:pic>
+      <p:sp>
+        <p:nvSpPr>
+          <p:cNvPr id="3" name="TextBox 2">
+            <a:extLst>
+              <a:ext uri="{FF2B5EF4-FFF2-40B4-BE49-F238E27FC236}">
+                <a16:creationId xmlns:a16="http://schemas.microsoft.com/office/drawing/2014/main" id="{C599C352-0451-F3C8-612F-A7D507071DC9}"/>
+              </a:ext>
+            </a:extLst>
+          </p:cNvPr>
+          <p:cNvSpPr txBox="1"/>
+          <p:nvPr/>
+        </p:nvSpPr>
+        <p:spPr>
+          <a:xfrm>
+            <a:off x="7394938" y="347972"/>
+            <a:ext cx="4797062" cy="4524315"/>
+          </a:xfrm>
+          <a:prstGeom prst="rect">
+            <a:avLst/>
+          </a:prstGeom>
+          <a:noFill/>
+        </p:spPr>
+        <p:txBody>
+          <a:bodyPr wrap="square" rtlCol="0">
+            <a:spAutoFit/>
+          </a:bodyPr>
+          <a:lstStyle/>
+          <a:p>
+            <a:pPr marL="285750" indent="-285750">
+              <a:buFont typeface="Arial" panose="020B0604020202020204" pitchFamily="34" charset="0"/>
+              <a:buChar char="•"/>
+            </a:pPr>
+            <a:r>
+              <a:rPr lang="en-US" sz="1600" dirty="0"/>
+              <a:t>Collinearity in features can drive model overfitting</a:t>
+            </a:r>
+          </a:p>
+          <a:p>
+            <a:pPr marL="285750" indent="-285750">
+              <a:buFont typeface="Arial" panose="020B0604020202020204" pitchFamily="34" charset="0"/>
+              <a:buChar char="•"/>
+            </a:pPr>
+            <a:r>
+              <a:rPr lang="en-US" sz="1600" dirty="0"/>
+              <a:t>Correlation matrix to check for collinearity</a:t>
+            </a:r>
+          </a:p>
+          <a:p>
+            <a:pPr marL="285750" indent="-285750">
+              <a:buFont typeface="Arial" panose="020B0604020202020204" pitchFamily="34" charset="0"/>
+              <a:buChar char="•"/>
+            </a:pPr>
+            <a:endParaRPr lang="en-US" sz="1600" dirty="0"/>
+          </a:p>
+          <a:p>
+            <a:pPr marL="285750" indent="-285750">
+              <a:buFont typeface="Arial" panose="020B0604020202020204" pitchFamily="34" charset="0"/>
+              <a:buChar char="•"/>
+            </a:pPr>
+            <a:r>
+              <a:rPr lang="en-US" sz="1600" u="sng" dirty="0"/>
+              <a:t>High collinearity (R &gt;0.7)</a:t>
+            </a:r>
+          </a:p>
+          <a:p>
+            <a:pPr marL="742950" lvl="1" indent="-285750">
+              <a:buFont typeface="Arial" panose="020B0604020202020204" pitchFamily="34" charset="0"/>
+              <a:buChar char="•"/>
+            </a:pPr>
+            <a:r>
+              <a:rPr lang="en-US" sz="1600" dirty="0" err="1"/>
+              <a:t>Houselight</a:t>
+            </a:r>
+            <a:r>
+              <a:rPr lang="en-US" sz="1600" dirty="0"/>
+              <a:t> Area Under Curve (HLAUC)</a:t>
+            </a:r>
+          </a:p>
+          <a:p>
+            <a:pPr marL="1200150" lvl="2" indent="-285750">
+              <a:buFont typeface="Arial" panose="020B0604020202020204" pitchFamily="34" charset="0"/>
+              <a:buChar char="•"/>
+            </a:pPr>
+            <a:r>
+              <a:rPr lang="en-US" sz="1600" dirty="0"/>
+              <a:t>HL Z-score maximum</a:t>
+            </a:r>
+          </a:p>
+          <a:p>
+            <a:pPr marL="1200150" lvl="2" indent="-285750">
+              <a:buFont typeface="Arial" panose="020B0604020202020204" pitchFamily="34" charset="0"/>
+              <a:buChar char="•"/>
+            </a:pPr>
+            <a:r>
+              <a:rPr lang="en-US" sz="1600" dirty="0"/>
+              <a:t>HL Z-score minimum</a:t>
+            </a:r>
+          </a:p>
+          <a:p>
+            <a:pPr marL="285750" indent="-285750">
+              <a:buFont typeface="Arial" panose="020B0604020202020204" pitchFamily="34" charset="0"/>
+              <a:buChar char="•"/>
+            </a:pPr>
+            <a:r>
+              <a:rPr lang="en-US" sz="1600" u="sng" dirty="0"/>
+              <a:t>Moderate collinearity (0.7 &gt; R &gt;0.3)</a:t>
+            </a:r>
+          </a:p>
+          <a:p>
+            <a:pPr marL="742950" lvl="1" indent="-285750">
+              <a:buFont typeface="Arial" panose="020B0604020202020204" pitchFamily="34" charset="0"/>
+              <a:buChar char="•"/>
+            </a:pPr>
+            <a:r>
+              <a:rPr lang="en-US" sz="1600" dirty="0"/>
+              <a:t>Trial#</a:t>
+            </a:r>
+          </a:p>
+          <a:p>
+            <a:pPr marL="1200150" lvl="2" indent="-285750">
+              <a:buFont typeface="Arial" panose="020B0604020202020204" pitchFamily="34" charset="0"/>
+              <a:buChar char="•"/>
+            </a:pPr>
+            <a:r>
+              <a:rPr lang="en-US" sz="1600" dirty="0"/>
+              <a:t>Lever press</a:t>
+            </a:r>
+          </a:p>
+          <a:p>
+            <a:pPr marL="742950" lvl="1" indent="-285750">
+              <a:buFont typeface="Arial" panose="020B0604020202020204" pitchFamily="34" charset="0"/>
+              <a:buChar char="•"/>
+            </a:pPr>
+            <a:r>
+              <a:rPr lang="en-US" sz="1600" dirty="0"/>
+              <a:t>Lever press</a:t>
+            </a:r>
+          </a:p>
+          <a:p>
+            <a:pPr marL="1200150" lvl="2" indent="-285750">
+              <a:buFont typeface="Arial" panose="020B0604020202020204" pitchFamily="34" charset="0"/>
+              <a:buChar char="•"/>
+            </a:pPr>
+            <a:r>
+              <a:rPr lang="en-US" sz="1600" dirty="0"/>
+              <a:t>Next Lever press</a:t>
+            </a:r>
+          </a:p>
+          <a:p>
+            <a:pPr marL="1200150" lvl="2" indent="-285750">
+              <a:buFont typeface="Arial" panose="020B0604020202020204" pitchFamily="34" charset="0"/>
+              <a:buChar char="•"/>
+            </a:pPr>
+            <a:r>
+              <a:rPr lang="en-US" sz="1600" dirty="0"/>
+              <a:t>Lever Area Under Curve</a:t>
+            </a:r>
+          </a:p>
+          <a:p>
+            <a:pPr marL="742950" lvl="1" indent="-285750">
+              <a:buFont typeface="Arial" panose="020B0604020202020204" pitchFamily="34" charset="0"/>
+              <a:buChar char="•"/>
+            </a:pPr>
+            <a:r>
+              <a:rPr lang="en-US" sz="1600" dirty="0"/>
+              <a:t>Lever Area Under Curve (</a:t>
+            </a:r>
+            <a:r>
+              <a:rPr lang="en-US" sz="1600" dirty="0" err="1"/>
+              <a:t>LeverAUC</a:t>
+            </a:r>
+            <a:r>
+              <a:rPr lang="en-US" sz="1600" dirty="0"/>
+              <a:t>)</a:t>
+            </a:r>
+          </a:p>
+          <a:p>
+            <a:pPr marL="1200150" lvl="2" indent="-285750">
+              <a:buFont typeface="Arial" panose="020B0604020202020204" pitchFamily="34" charset="0"/>
+              <a:buChar char="•"/>
+            </a:pPr>
+            <a:r>
+              <a:rPr lang="en-US" sz="1600" dirty="0"/>
+              <a:t>Lever Z-score maximum</a:t>
+            </a:r>
+          </a:p>
+          <a:p>
+            <a:pPr marL="1200150" lvl="2" indent="-285750">
+              <a:buFont typeface="Arial" panose="020B0604020202020204" pitchFamily="34" charset="0"/>
+              <a:buChar char="•"/>
+            </a:pPr>
+            <a:r>
+              <a:rPr lang="en-US" sz="1600" dirty="0"/>
+              <a:t>Lever Z-score minimum</a:t>
+            </a:r>
+          </a:p>
+          <a:p>
+            <a:pPr marL="285750" indent="-285750">
+              <a:buFont typeface="Arial" panose="020B0604020202020204" pitchFamily="34" charset="0"/>
+              <a:buChar char="•"/>
+            </a:pPr>
+            <a:endParaRPr lang="en-US" sz="1600" dirty="0"/>
+          </a:p>
+          <a:p>
+            <a:pPr marL="285750" indent="-285750">
+              <a:buFont typeface="Arial" panose="020B0604020202020204" pitchFamily="34" charset="0"/>
+              <a:buChar char="•"/>
+            </a:pPr>
+            <a:endParaRPr lang="en-US" sz="1600" dirty="0"/>
+          </a:p>
+        </p:txBody>
+      </p:sp>
     </p:spTree>
     <p:extLst>
       <p:ext uri="{BB962C8B-B14F-4D97-AF65-F5344CB8AC3E}">
-        <p14:creationId xmlns:p14="http://schemas.microsoft.com/office/powerpoint/2010/main" val="2936499389"/>
+        <p14:creationId xmlns:p14="http://schemas.microsoft.com/office/powerpoint/2010/main" val="110852346"/>
       </p:ext>
     </p:extLst>
   </p:cSld>
@@ -4749,7 +4436,7 @@
         </p:nvSpPr>
         <p:spPr>
           <a:xfrm>
-            <a:off x="0" y="0"/>
+            <a:off x="-1" y="0"/>
             <a:ext cx="12191999" cy="523220"/>
           </a:xfrm>
           <a:prstGeom prst="rect">
@@ -4765,7 +4452,15 @@
           <a:p>
             <a:r>
               <a:rPr lang="en-US" sz="2800" dirty="0"/>
-              <a:t>Random Forest w/ manual resampling to minority class and only 300uA data </a:t>
+              <a:t>Random Forest w/ SMOTE [</a:t>
+            </a:r>
+            <a:r>
+              <a:rPr lang="en-US" sz="2800" dirty="0" err="1"/>
+              <a:t>df</a:t>
+            </a:r>
+            <a:r>
+              <a:rPr lang="en-US" sz="2800" dirty="0"/>
+              <a:t> = 100to300]</a:t>
             </a:r>
           </a:p>
         </p:txBody>
@@ -4785,7 +4480,7 @@
         <p:spPr>
           <a:xfrm>
             <a:off x="0" y="615553"/>
-            <a:ext cx="12191999" cy="830997"/>
+            <a:ext cx="12191999" cy="584775"/>
           </a:xfrm>
           <a:prstGeom prst="rect">
             <a:avLst/>
@@ -4800,7 +4495,7 @@
           <a:p>
             <a:r>
               <a:rPr lang="en-US" sz="1600" dirty="0"/>
-              <a:t>Features: ['Trial#','Lever','LeverZmax','LeverZmin','LeverAUC','HLZmax','HLZmin','HLAUC','NextLever’]</a:t>
+              <a:t>Features: ['Trial#','Lever','LeverZmax','LeverZmin','LeverAUC','HLZmax','HLZmin','HLAUC','NextLever','Shock'] </a:t>
             </a:r>
           </a:p>
           <a:p>
@@ -4814,79 +4509,17 @@
             </a:r>
             <a:r>
               <a:rPr lang="en-US" sz="1600" dirty="0"/>
-              <a:t> classes (small=109, large = 678), I </a:t>
-            </a:r>
-            <a:r>
-              <a:rPr lang="en-US" sz="1600" dirty="0" err="1"/>
-              <a:t>downsampled</a:t>
-            </a:r>
-            <a:r>
-              <a:rPr lang="en-US" sz="1600" dirty="0"/>
-              <a:t> </a:t>
-            </a:r>
-            <a:r>
-              <a:rPr lang="en-US" sz="1600" dirty="0" err="1"/>
-              <a:t>NextLever</a:t>
-            </a:r>
-            <a:r>
-              <a:rPr lang="en-US" sz="1600" dirty="0"/>
-              <a:t>=1 to be the size of </a:t>
-            </a:r>
-            <a:r>
-              <a:rPr lang="en-US" sz="1600" dirty="0" err="1"/>
-              <a:t>NextLever</a:t>
-            </a:r>
-            <a:r>
-              <a:rPr lang="en-US" sz="1600" dirty="0"/>
-              <a:t>=0 (109)</a:t>
-            </a:r>
-          </a:p>
-          <a:p>
-            <a:r>
-              <a:rPr lang="en-US" sz="1600" dirty="0"/>
-              <a:t>rf = </a:t>
-            </a:r>
-            <a:r>
-              <a:rPr lang="en-US" sz="1600" dirty="0" err="1"/>
-              <a:t>RandomForestClassifier</a:t>
-            </a:r>
-            <a:r>
-              <a:rPr lang="en-US" sz="1600" dirty="0"/>
-              <a:t>(</a:t>
-            </a:r>
-            <a:r>
-              <a:rPr lang="en-US" sz="1600" dirty="0" err="1"/>
-              <a:t>n_estimators</a:t>
-            </a:r>
-            <a:r>
-              <a:rPr lang="en-US" sz="1600" dirty="0"/>
-              <a:t>=100, </a:t>
-            </a:r>
-            <a:r>
-              <a:rPr lang="en-US" sz="1600" dirty="0" err="1"/>
-              <a:t>random_state</a:t>
-            </a:r>
-            <a:r>
-              <a:rPr lang="en-US" sz="1600" dirty="0"/>
-              <a:t>=42, </a:t>
-            </a:r>
-            <a:r>
-              <a:rPr lang="en-US" sz="1600" dirty="0" err="1"/>
-              <a:t>class_weight</a:t>
-            </a:r>
-            <a:r>
-              <a:rPr lang="en-US" sz="1600" dirty="0"/>
-              <a:t>='balanced')</a:t>
+              <a:t> classes (small=179, large = 2166), I opted for Random Forest + SMOTE oversampling</a:t>
             </a:r>
           </a:p>
         </p:txBody>
       </p:sp>
       <p:pic>
         <p:nvPicPr>
-          <p:cNvPr id="6" name="Picture 5">
-            <a:extLst>
-              <a:ext uri="{FF2B5EF4-FFF2-40B4-BE49-F238E27FC236}">
-                <a16:creationId xmlns:a16="http://schemas.microsoft.com/office/drawing/2014/main" id="{F1C3A436-99B4-72EB-53F4-0BAE1C011A31}"/>
+          <p:cNvPr id="7" name="Picture 6">
+            <a:extLst>
+              <a:ext uri="{FF2B5EF4-FFF2-40B4-BE49-F238E27FC236}">
+                <a16:creationId xmlns:a16="http://schemas.microsoft.com/office/drawing/2014/main" id="{A4D6B3BB-4C88-EBD2-F89E-0ADBC820554D}"/>
               </a:ext>
             </a:extLst>
           </p:cNvPr>
@@ -4903,8 +4536,8 @@
         </p:blipFill>
         <p:spPr>
           <a:xfrm>
-            <a:off x="152166" y="1538883"/>
-            <a:ext cx="3353268" cy="2143424"/>
+            <a:off x="122782" y="1318077"/>
+            <a:ext cx="3436918" cy="2110923"/>
           </a:xfrm>
           <a:prstGeom prst="rect">
             <a:avLst/>
@@ -4916,7 +4549,7 @@
           <p:cNvPr id="9" name="Picture 8">
             <a:extLst>
               <a:ext uri="{FF2B5EF4-FFF2-40B4-BE49-F238E27FC236}">
-                <a16:creationId xmlns:a16="http://schemas.microsoft.com/office/drawing/2014/main" id="{BD48F232-2ECA-3B52-0972-1B12EAC84B24}"/>
+                <a16:creationId xmlns:a16="http://schemas.microsoft.com/office/drawing/2014/main" id="{12AD28AA-227F-DE35-0510-70BF5089E653}"/>
               </a:ext>
             </a:extLst>
           </p:cNvPr>
@@ -4933,12 +4566,17 @@
         </p:blipFill>
         <p:spPr>
           <a:xfrm>
-            <a:off x="3616883" y="1446551"/>
-            <a:ext cx="2874352" cy="2239702"/>
-          </a:xfrm>
-          <a:prstGeom prst="rect">
-            <a:avLst/>
-          </a:prstGeom>
+            <a:off x="3642048" y="1318077"/>
+            <a:ext cx="2712099" cy="2113274"/>
+          </a:xfrm>
+          <a:prstGeom prst="rect">
+            <a:avLst/>
+          </a:prstGeom>
+          <a:ln>
+            <a:solidFill>
+              <a:schemeClr val="tx1"/>
+            </a:solidFill>
+          </a:ln>
         </p:spPr>
       </p:pic>
       <p:pic>
@@ -4946,7 +4584,7 @@
           <p:cNvPr id="11" name="Picture 10">
             <a:extLst>
               <a:ext uri="{FF2B5EF4-FFF2-40B4-BE49-F238E27FC236}">
-                <a16:creationId xmlns:a16="http://schemas.microsoft.com/office/drawing/2014/main" id="{23C38F55-9692-EB2E-040D-D6174C61FBD4}"/>
+                <a16:creationId xmlns:a16="http://schemas.microsoft.com/office/drawing/2014/main" id="{C6F3EE12-9E96-D2BA-78A7-E913AA00C6BD}"/>
               </a:ext>
             </a:extLst>
           </p:cNvPr>
@@ -4963,20 +4601,25 @@
         </p:blipFill>
         <p:spPr>
           <a:xfrm>
-            <a:off x="6602684" y="1446551"/>
-            <a:ext cx="3353268" cy="2396312"/>
-          </a:xfrm>
-          <a:prstGeom prst="rect">
-            <a:avLst/>
-          </a:prstGeom>
+            <a:off x="6436495" y="1318077"/>
+            <a:ext cx="2953910" cy="2110923"/>
+          </a:xfrm>
+          <a:prstGeom prst="rect">
+            <a:avLst/>
+          </a:prstGeom>
+          <a:ln>
+            <a:solidFill>
+              <a:schemeClr val="tx1"/>
+            </a:solidFill>
+          </a:ln>
         </p:spPr>
       </p:pic>
       <p:pic>
         <p:nvPicPr>
-          <p:cNvPr id="14" name="Picture 13">
-            <a:extLst>
-              <a:ext uri="{FF2B5EF4-FFF2-40B4-BE49-F238E27FC236}">
-                <a16:creationId xmlns:a16="http://schemas.microsoft.com/office/drawing/2014/main" id="{B7296D0F-2CF9-4BC8-DC86-B84F8DCB384A}"/>
+          <p:cNvPr id="13" name="Picture 12">
+            <a:extLst>
+              <a:ext uri="{FF2B5EF4-FFF2-40B4-BE49-F238E27FC236}">
+                <a16:creationId xmlns:a16="http://schemas.microsoft.com/office/drawing/2014/main" id="{2BFD1B95-530F-4660-DC83-21BB596702E9}"/>
               </a:ext>
             </a:extLst>
           </p:cNvPr>
@@ -4993,20 +4636,25 @@
         </p:blipFill>
         <p:spPr>
           <a:xfrm>
-            <a:off x="152469" y="3817860"/>
-            <a:ext cx="1595200" cy="1329333"/>
-          </a:xfrm>
-          <a:prstGeom prst="rect">
-            <a:avLst/>
-          </a:prstGeom>
+            <a:off x="151308" y="3546750"/>
+            <a:ext cx="1927382" cy="1606152"/>
+          </a:xfrm>
+          <a:prstGeom prst="rect">
+            <a:avLst/>
+          </a:prstGeom>
+          <a:ln>
+            <a:solidFill>
+              <a:schemeClr val="tx1"/>
+            </a:solidFill>
+          </a:ln>
         </p:spPr>
       </p:pic>
       <p:pic>
         <p:nvPicPr>
-          <p:cNvPr id="17" name="Picture 16">
-            <a:extLst>
-              <a:ext uri="{FF2B5EF4-FFF2-40B4-BE49-F238E27FC236}">
-                <a16:creationId xmlns:a16="http://schemas.microsoft.com/office/drawing/2014/main" id="{D624A70F-BB85-4228-2514-2C909C3BA191}"/>
+          <p:cNvPr id="15" name="Picture 14">
+            <a:extLst>
+              <a:ext uri="{FF2B5EF4-FFF2-40B4-BE49-F238E27FC236}">
+                <a16:creationId xmlns:a16="http://schemas.microsoft.com/office/drawing/2014/main" id="{F05FE7D0-CAC1-F329-0891-6B87F6ABB447}"/>
               </a:ext>
             </a:extLst>
           </p:cNvPr>
@@ -5023,20 +4671,25 @@
         </p:blipFill>
         <p:spPr>
           <a:xfrm>
-            <a:off x="1859118" y="3817860"/>
-            <a:ext cx="1570275" cy="1329333"/>
-          </a:xfrm>
-          <a:prstGeom prst="rect">
-            <a:avLst/>
-          </a:prstGeom>
+            <a:off x="2274104" y="3546751"/>
+            <a:ext cx="1897267" cy="1606152"/>
+          </a:xfrm>
+          <a:prstGeom prst="rect">
+            <a:avLst/>
+          </a:prstGeom>
+          <a:ln>
+            <a:solidFill>
+              <a:schemeClr val="tx1"/>
+            </a:solidFill>
+          </a:ln>
         </p:spPr>
       </p:pic>
       <p:pic>
         <p:nvPicPr>
-          <p:cNvPr id="19" name="Picture 18">
-            <a:extLst>
-              <a:ext uri="{FF2B5EF4-FFF2-40B4-BE49-F238E27FC236}">
-                <a16:creationId xmlns:a16="http://schemas.microsoft.com/office/drawing/2014/main" id="{19FFACBD-B702-B264-0CF2-06F0C59B097B}"/>
+          <p:cNvPr id="17" name="Picture 16">
+            <a:extLst>
+              <a:ext uri="{FF2B5EF4-FFF2-40B4-BE49-F238E27FC236}">
+                <a16:creationId xmlns:a16="http://schemas.microsoft.com/office/drawing/2014/main" id="{EE4A3449-3F4C-8CDE-61C1-4DA9D83172D1}"/>
               </a:ext>
             </a:extLst>
           </p:cNvPr>
@@ -5053,20 +4706,25 @@
         </p:blipFill>
         <p:spPr>
           <a:xfrm>
-            <a:off x="3602020" y="3817859"/>
-            <a:ext cx="1595200" cy="1329333"/>
-          </a:xfrm>
-          <a:prstGeom prst="rect">
-            <a:avLst/>
-          </a:prstGeom>
+            <a:off x="4375255" y="3546750"/>
+            <a:ext cx="1927382" cy="1606152"/>
+          </a:xfrm>
+          <a:prstGeom prst="rect">
+            <a:avLst/>
+          </a:prstGeom>
+          <a:ln>
+            <a:solidFill>
+              <a:schemeClr val="tx1"/>
+            </a:solidFill>
+          </a:ln>
         </p:spPr>
       </p:pic>
       <p:pic>
         <p:nvPicPr>
-          <p:cNvPr id="22" name="Picture 21">
-            <a:extLst>
-              <a:ext uri="{FF2B5EF4-FFF2-40B4-BE49-F238E27FC236}">
-                <a16:creationId xmlns:a16="http://schemas.microsoft.com/office/drawing/2014/main" id="{8594F0AC-AE61-6160-203C-4EA38A7DE2F0}"/>
+          <p:cNvPr id="19" name="Picture 18">
+            <a:extLst>
+              <a:ext uri="{FF2B5EF4-FFF2-40B4-BE49-F238E27FC236}">
+                <a16:creationId xmlns:a16="http://schemas.microsoft.com/office/drawing/2014/main" id="{76B20AB3-11FC-5F28-3AD8-3ECB802F4092}"/>
               </a:ext>
             </a:extLst>
           </p:cNvPr>
@@ -5083,20 +4741,25 @@
         </p:blipFill>
         <p:spPr>
           <a:xfrm>
-            <a:off x="5283744" y="3816864"/>
-            <a:ext cx="1595200" cy="1329333"/>
-          </a:xfrm>
-          <a:prstGeom prst="rect">
-            <a:avLst/>
-          </a:prstGeom>
+            <a:off x="6538393" y="3546750"/>
+            <a:ext cx="1927382" cy="1606152"/>
+          </a:xfrm>
+          <a:prstGeom prst="rect">
+            <a:avLst/>
+          </a:prstGeom>
+          <a:ln>
+            <a:solidFill>
+              <a:schemeClr val="tx1"/>
+            </a:solidFill>
+          </a:ln>
         </p:spPr>
       </p:pic>
       <p:pic>
         <p:nvPicPr>
-          <p:cNvPr id="25" name="Picture 24">
-            <a:extLst>
-              <a:ext uri="{FF2B5EF4-FFF2-40B4-BE49-F238E27FC236}">
-                <a16:creationId xmlns:a16="http://schemas.microsoft.com/office/drawing/2014/main" id="{CD508024-BC39-02EA-D50F-B77AA210F7DE}"/>
+          <p:cNvPr id="21" name="Picture 20">
+            <a:extLst>
+              <a:ext uri="{FF2B5EF4-FFF2-40B4-BE49-F238E27FC236}">
+                <a16:creationId xmlns:a16="http://schemas.microsoft.com/office/drawing/2014/main" id="{76DCCE0F-434D-74C9-3C85-242E4A4C865F}"/>
               </a:ext>
             </a:extLst>
           </p:cNvPr>
@@ -5113,20 +4776,25 @@
         </p:blipFill>
         <p:spPr>
           <a:xfrm>
-            <a:off x="7138095" y="3842863"/>
-            <a:ext cx="1595200" cy="1329333"/>
-          </a:xfrm>
-          <a:prstGeom prst="rect">
-            <a:avLst/>
-          </a:prstGeom>
+            <a:off x="8701531" y="3546749"/>
+            <a:ext cx="1927382" cy="1606152"/>
+          </a:xfrm>
+          <a:prstGeom prst="rect">
+            <a:avLst/>
+          </a:prstGeom>
+          <a:ln>
+            <a:solidFill>
+              <a:schemeClr val="tx1"/>
+            </a:solidFill>
+          </a:ln>
         </p:spPr>
       </p:pic>
       <p:pic>
         <p:nvPicPr>
-          <p:cNvPr id="27" name="Picture 26">
-            <a:extLst>
-              <a:ext uri="{FF2B5EF4-FFF2-40B4-BE49-F238E27FC236}">
-                <a16:creationId xmlns:a16="http://schemas.microsoft.com/office/drawing/2014/main" id="{62A537D2-3FC9-24B4-1711-A29486B5CC37}"/>
+          <p:cNvPr id="23" name="Picture 22">
+            <a:extLst>
+              <a:ext uri="{FF2B5EF4-FFF2-40B4-BE49-F238E27FC236}">
+                <a16:creationId xmlns:a16="http://schemas.microsoft.com/office/drawing/2014/main" id="{534EF11D-E64D-D37D-49B4-433D751C346D}"/>
               </a:ext>
             </a:extLst>
           </p:cNvPr>
@@ -5143,20 +4811,25 @@
         </p:blipFill>
         <p:spPr>
           <a:xfrm>
-            <a:off x="152469" y="5319116"/>
-            <a:ext cx="1595200" cy="1329333"/>
-          </a:xfrm>
-          <a:prstGeom prst="rect">
-            <a:avLst/>
-          </a:prstGeom>
+            <a:off x="151308" y="5251848"/>
+            <a:ext cx="1927382" cy="1606152"/>
+          </a:xfrm>
+          <a:prstGeom prst="rect">
+            <a:avLst/>
+          </a:prstGeom>
+          <a:ln>
+            <a:solidFill>
+              <a:schemeClr val="tx1"/>
+            </a:solidFill>
+          </a:ln>
         </p:spPr>
       </p:pic>
       <p:pic>
         <p:nvPicPr>
-          <p:cNvPr id="30" name="Picture 29">
-            <a:extLst>
-              <a:ext uri="{FF2B5EF4-FFF2-40B4-BE49-F238E27FC236}">
-                <a16:creationId xmlns:a16="http://schemas.microsoft.com/office/drawing/2014/main" id="{E547E840-E195-B34E-DAA7-5FBF9ED455C8}"/>
+          <p:cNvPr id="25" name="Picture 24">
+            <a:extLst>
+              <a:ext uri="{FF2B5EF4-FFF2-40B4-BE49-F238E27FC236}">
+                <a16:creationId xmlns:a16="http://schemas.microsoft.com/office/drawing/2014/main" id="{CC99607A-650C-8910-23E2-C54389B30435}"/>
               </a:ext>
             </a:extLst>
           </p:cNvPr>
@@ -5173,20 +4846,25 @@
         </p:blipFill>
         <p:spPr>
           <a:xfrm>
-            <a:off x="1859118" y="5319117"/>
-            <a:ext cx="1595200" cy="1329333"/>
-          </a:xfrm>
-          <a:prstGeom prst="rect">
-            <a:avLst/>
-          </a:prstGeom>
+            <a:off x="2274105" y="5224124"/>
+            <a:ext cx="1927382" cy="1606152"/>
+          </a:xfrm>
+          <a:prstGeom prst="rect">
+            <a:avLst/>
+          </a:prstGeom>
+          <a:ln>
+            <a:solidFill>
+              <a:schemeClr val="tx1"/>
+            </a:solidFill>
+          </a:ln>
         </p:spPr>
       </p:pic>
       <p:pic>
         <p:nvPicPr>
-          <p:cNvPr id="33" name="Picture 32">
-            <a:extLst>
-              <a:ext uri="{FF2B5EF4-FFF2-40B4-BE49-F238E27FC236}">
-                <a16:creationId xmlns:a16="http://schemas.microsoft.com/office/drawing/2014/main" id="{3C5D45E6-DDAC-71CD-F092-7F5FED4E1F14}"/>
+          <p:cNvPr id="27" name="Picture 26">
+            <a:extLst>
+              <a:ext uri="{FF2B5EF4-FFF2-40B4-BE49-F238E27FC236}">
+                <a16:creationId xmlns:a16="http://schemas.microsoft.com/office/drawing/2014/main" id="{271EFAA1-5A37-9E62-26F3-477F16961E10}"/>
               </a:ext>
             </a:extLst>
           </p:cNvPr>
@@ -5203,8 +4881,78 @@
         </p:blipFill>
         <p:spPr>
           <a:xfrm>
-            <a:off x="3616883" y="5319115"/>
-            <a:ext cx="1595200" cy="1329333"/>
+            <a:off x="4396902" y="5224124"/>
+            <a:ext cx="1927382" cy="1606152"/>
+          </a:xfrm>
+          <a:prstGeom prst="rect">
+            <a:avLst/>
+          </a:prstGeom>
+          <a:ln>
+            <a:solidFill>
+              <a:schemeClr val="tx1"/>
+            </a:solidFill>
+          </a:ln>
+        </p:spPr>
+      </p:pic>
+      <p:pic>
+        <p:nvPicPr>
+          <p:cNvPr id="29" name="Picture 28">
+            <a:extLst>
+              <a:ext uri="{FF2B5EF4-FFF2-40B4-BE49-F238E27FC236}">
+                <a16:creationId xmlns:a16="http://schemas.microsoft.com/office/drawing/2014/main" id="{88FA5E9B-3433-31AF-A923-7400787AE724}"/>
+              </a:ext>
+            </a:extLst>
+          </p:cNvPr>
+          <p:cNvPicPr>
+            <a:picLocks noChangeAspect="1"/>
+          </p:cNvPicPr>
+          <p:nvPr/>
+        </p:nvPicPr>
+        <p:blipFill>
+          <a:blip r:embed="rId13"/>
+          <a:stretch>
+            <a:fillRect/>
+          </a:stretch>
+        </p:blipFill>
+        <p:spPr>
+          <a:xfrm>
+            <a:off x="6538392" y="5224126"/>
+            <a:ext cx="1897267" cy="1606152"/>
+          </a:xfrm>
+          <a:prstGeom prst="rect">
+            <a:avLst/>
+          </a:prstGeom>
+          <a:ln>
+            <a:solidFill>
+              <a:schemeClr val="tx1"/>
+            </a:solidFill>
+          </a:ln>
+        </p:spPr>
+      </p:pic>
+      <p:pic>
+        <p:nvPicPr>
+          <p:cNvPr id="31" name="Picture 30">
+            <a:extLst>
+              <a:ext uri="{FF2B5EF4-FFF2-40B4-BE49-F238E27FC236}">
+                <a16:creationId xmlns:a16="http://schemas.microsoft.com/office/drawing/2014/main" id="{7C9F9210-8736-15CF-ACEC-3BD7DF0172D4}"/>
+              </a:ext>
+            </a:extLst>
+          </p:cNvPr>
+          <p:cNvPicPr>
+            <a:picLocks noChangeAspect="1"/>
+          </p:cNvPicPr>
+          <p:nvPr/>
+        </p:nvPicPr>
+        <p:blipFill>
+          <a:blip r:embed="rId14"/>
+          <a:stretch>
+            <a:fillRect/>
+          </a:stretch>
+        </p:blipFill>
+        <p:spPr>
+          <a:xfrm>
+            <a:off x="8701531" y="5241922"/>
+            <a:ext cx="2484630" cy="1589582"/>
           </a:xfrm>
           <a:prstGeom prst="rect">
             <a:avLst/>
@@ -5214,7 +4962,7 @@
     </p:spTree>
     <p:extLst>
       <p:ext uri="{BB962C8B-B14F-4D97-AF65-F5344CB8AC3E}">
-        <p14:creationId xmlns:p14="http://schemas.microsoft.com/office/powerpoint/2010/main" val="1516434053"/>
+        <p14:creationId xmlns:p14="http://schemas.microsoft.com/office/powerpoint/2010/main" val="430772491"/>
       </p:ext>
     </p:extLst>
   </p:cSld>
@@ -5256,7 +5004,7 @@
         <p:spPr>
           <a:xfrm>
             <a:off x="-1" y="0"/>
-            <a:ext cx="12191999" cy="523220"/>
+            <a:ext cx="12700001" cy="523220"/>
           </a:xfrm>
           <a:prstGeom prst="rect">
             <a:avLst/>
@@ -5271,7 +5019,15 @@
           <a:p>
             <a:r>
               <a:rPr lang="en-US" sz="2800" dirty="0"/>
-              <a:t>SVM w/ manual resampling to minority class and only 300uA data</a:t>
+              <a:t>Random Forest w/ manual resampling to minority class [</a:t>
+            </a:r>
+            <a:r>
+              <a:rPr lang="en-US" sz="2800" dirty="0" err="1"/>
+              <a:t>df</a:t>
+            </a:r>
+            <a:r>
+              <a:rPr lang="en-US" sz="2800" dirty="0"/>
+              <a:t> = 100to300uA]</a:t>
             </a:r>
           </a:p>
         </p:txBody>
@@ -5290,8 +5046,8 @@
         </p:nvSpPr>
         <p:spPr>
           <a:xfrm>
-            <a:off x="-1" y="523220"/>
-            <a:ext cx="12191999" cy="1323439"/>
+            <a:off x="0" y="615553"/>
+            <a:ext cx="12191999" cy="584775"/>
           </a:xfrm>
           <a:prstGeom prst="rect">
             <a:avLst/>
@@ -5305,28 +5061,14 @@
           <a:lstStyle/>
           <a:p>
             <a:r>
-              <a:rPr lang="en-US" sz="1600" dirty="0" err="1"/>
-              <a:t>feature_names</a:t>
-            </a:r>
-            <a:r>
-              <a:rPr lang="en-US" sz="1600" dirty="0"/>
-              <a:t> = ['</a:t>
-            </a:r>
-            <a:r>
-              <a:rPr lang="en-US" sz="1600" dirty="0" err="1"/>
-              <a:t>LeverZmax</a:t>
-            </a:r>
-            <a:r>
-              <a:rPr lang="en-US" sz="1600" dirty="0"/>
-              <a:t>','</a:t>
-            </a:r>
-            <a:r>
-              <a:rPr lang="en-US" sz="1600" dirty="0" err="1"/>
-              <a:t>HLZmax</a:t>
-            </a:r>
-            <a:r>
-              <a:rPr lang="en-US" sz="1600" dirty="0"/>
-              <a:t>','</a:t>
+              <a:rPr lang="en-US" sz="1600" dirty="0"/>
+              <a:t>Features: ['Trial#','Lever','LeverZmax','LeverZmin','LeverAUC','HLZmax','HLZmin','HLAUC','NextLever','Shock'] </a:t>
+            </a:r>
+          </a:p>
+          <a:p>
+            <a:r>
+              <a:rPr lang="en-US" sz="1600" dirty="0"/>
+              <a:t>Due to imbalance within the </a:t>
             </a:r>
             <a:r>
               <a:rPr lang="en-US" sz="1600" dirty="0" err="1"/>
@@ -5334,13 +5076,15 @@
             </a:r>
             <a:r>
               <a:rPr lang="en-US" sz="1600" dirty="0"/>
-              <a:t>’] (‘Trial#’ excluded due to concerns of overfitting (too specific to this data))</a:t>
-            </a:r>
-          </a:p>
-          <a:p>
-            <a:r>
-              <a:rPr lang="en-US" sz="1600" dirty="0"/>
-              <a:t>Due to imbalance within the </a:t>
+              <a:t> classes (small=179, large = 2166), I </a:t>
+            </a:r>
+            <a:r>
+              <a:rPr lang="en-US" sz="1600" dirty="0" err="1"/>
+              <a:t>downsampled</a:t>
+            </a:r>
+            <a:r>
+              <a:rPr lang="en-US" sz="1600" dirty="0"/>
+              <a:t> </a:t>
             </a:r>
             <a:r>
               <a:rPr lang="en-US" sz="1600" dirty="0" err="1"/>
@@ -5348,15 +5092,7 @@
             </a:r>
             <a:r>
               <a:rPr lang="en-US" sz="1600" dirty="0"/>
-              <a:t> classes (small=109, large = 678), I </a:t>
-            </a:r>
-            <a:r>
-              <a:rPr lang="en-US" sz="1600" dirty="0" err="1"/>
-              <a:t>downsampled</a:t>
-            </a:r>
-            <a:r>
-              <a:rPr lang="en-US" sz="1600" dirty="0"/>
-              <a:t> </a:t>
+              <a:t>=1 to be the size of </a:t>
             </a:r>
             <a:r>
               <a:rPr lang="en-US" sz="1600" dirty="0" err="1"/>
@@ -5364,64 +5100,17 @@
             </a:r>
             <a:r>
               <a:rPr lang="en-US" sz="1600" dirty="0"/>
-              <a:t>=1 to be the size of </a:t>
-            </a:r>
-            <a:r>
-              <a:rPr lang="en-US" sz="1600" dirty="0" err="1"/>
-              <a:t>NextLever</a:t>
-            </a:r>
-            <a:r>
-              <a:rPr lang="en-US" sz="1600" dirty="0"/>
-              <a:t>=0 (109)</a:t>
-            </a:r>
-          </a:p>
-          <a:p>
-            <a:r>
-              <a:rPr lang="en-US" sz="1600" dirty="0" err="1"/>
-              <a:t>Dataframe</a:t>
-            </a:r>
-            <a:r>
-              <a:rPr lang="en-US" sz="1600" dirty="0"/>
-              <a:t> was normalized (</a:t>
-            </a:r>
-            <a:r>
-              <a:rPr lang="en-US" sz="1600" dirty="0" err="1"/>
-              <a:t>StandardScaler</a:t>
-            </a:r>
-            <a:r>
-              <a:rPr lang="en-US" sz="1600" dirty="0"/>
-              <a:t>()) prior to model training</a:t>
-            </a:r>
-          </a:p>
-          <a:p>
-            <a:r>
-              <a:rPr lang="en-US" sz="1600" dirty="0" err="1"/>
-              <a:t>svm_model</a:t>
-            </a:r>
-            <a:r>
-              <a:rPr lang="en-US" sz="1600" dirty="0"/>
-              <a:t> = SVC(kernel='linear', </a:t>
-            </a:r>
-            <a:r>
-              <a:rPr lang="en-US" sz="1600" dirty="0" err="1"/>
-              <a:t>class_weight</a:t>
-            </a:r>
-            <a:r>
-              <a:rPr lang="en-US" sz="1600" dirty="0"/>
-              <a:t>='balanced', probability=True)</a:t>
-            </a:r>
-          </a:p>
-          <a:p>
-            <a:endParaRPr lang="en-US" sz="1600" dirty="0"/>
+              <a:t>=0 (179)</a:t>
+            </a:r>
           </a:p>
         </p:txBody>
       </p:sp>
       <p:pic>
         <p:nvPicPr>
-          <p:cNvPr id="6" name="Picture 5">
-            <a:extLst>
-              <a:ext uri="{FF2B5EF4-FFF2-40B4-BE49-F238E27FC236}">
-                <a16:creationId xmlns:a16="http://schemas.microsoft.com/office/drawing/2014/main" id="{6AE4BD07-CF64-36E0-FAF8-61B08200529A}"/>
+          <p:cNvPr id="4" name="Picture 3">
+            <a:extLst>
+              <a:ext uri="{FF2B5EF4-FFF2-40B4-BE49-F238E27FC236}">
+                <a16:creationId xmlns:a16="http://schemas.microsoft.com/office/drawing/2014/main" id="{61ED0A8E-2E00-5C62-01D2-792607E1D0A6}"/>
               </a:ext>
             </a:extLst>
           </p:cNvPr>
@@ -5438,8 +5127,8 @@
         </p:blipFill>
         <p:spPr>
           <a:xfrm>
-            <a:off x="141004" y="1617203"/>
-            <a:ext cx="2628322" cy="1571120"/>
+            <a:off x="177055" y="1200328"/>
+            <a:ext cx="3421677" cy="2088061"/>
           </a:xfrm>
           <a:prstGeom prst="rect">
             <a:avLst/>
@@ -5448,10 +5137,10 @@
       </p:pic>
       <p:pic>
         <p:nvPicPr>
-          <p:cNvPr id="9" name="Picture 8">
-            <a:extLst>
-              <a:ext uri="{FF2B5EF4-FFF2-40B4-BE49-F238E27FC236}">
-                <a16:creationId xmlns:a16="http://schemas.microsoft.com/office/drawing/2014/main" id="{D667C8EA-6535-FF3C-ECE3-E138FF1EC9BB}"/>
+          <p:cNvPr id="8" name="Picture 7">
+            <a:extLst>
+              <a:ext uri="{FF2B5EF4-FFF2-40B4-BE49-F238E27FC236}">
+                <a16:creationId xmlns:a16="http://schemas.microsoft.com/office/drawing/2014/main" id="{DE0F9680-94AE-0F81-CC53-80F8F7EF1C0C}"/>
               </a:ext>
             </a:extLst>
           </p:cNvPr>
@@ -5468,8 +5157,8 @@
         </p:blipFill>
         <p:spPr>
           <a:xfrm>
-            <a:off x="2910331" y="1584375"/>
-            <a:ext cx="2038741" cy="1604891"/>
+            <a:off x="3775787" y="1200328"/>
+            <a:ext cx="2679742" cy="2088061"/>
           </a:xfrm>
           <a:prstGeom prst="rect">
             <a:avLst/>
@@ -5478,10 +5167,10 @@
       </p:pic>
       <p:pic>
         <p:nvPicPr>
-          <p:cNvPr id="11" name="Picture 10">
-            <a:extLst>
-              <a:ext uri="{FF2B5EF4-FFF2-40B4-BE49-F238E27FC236}">
-                <a16:creationId xmlns:a16="http://schemas.microsoft.com/office/drawing/2014/main" id="{D3C0E9A1-E853-786A-E05E-FD78E1E30CE5}"/>
+          <p:cNvPr id="12" name="Picture 11">
+            <a:extLst>
+              <a:ext uri="{FF2B5EF4-FFF2-40B4-BE49-F238E27FC236}">
+                <a16:creationId xmlns:a16="http://schemas.microsoft.com/office/drawing/2014/main" id="{3E804412-1CF8-3183-718A-F7C07B6D1C22}"/>
               </a:ext>
             </a:extLst>
           </p:cNvPr>
@@ -5498,8 +5187,8 @@
         </p:blipFill>
         <p:spPr>
           <a:xfrm>
-            <a:off x="5090077" y="1560037"/>
-            <a:ext cx="2254549" cy="1628286"/>
+            <a:off x="6632584" y="1200329"/>
+            <a:ext cx="2679743" cy="1914998"/>
           </a:xfrm>
           <a:prstGeom prst="rect">
             <a:avLst/>
@@ -5508,10 +5197,10 @@
       </p:pic>
       <p:pic>
         <p:nvPicPr>
-          <p:cNvPr id="14" name="Picture 13">
-            <a:extLst>
-              <a:ext uri="{FF2B5EF4-FFF2-40B4-BE49-F238E27FC236}">
-                <a16:creationId xmlns:a16="http://schemas.microsoft.com/office/drawing/2014/main" id="{F841531B-9EB5-E210-ADA5-57E1F1281CE8}"/>
+          <p:cNvPr id="16" name="Picture 15">
+            <a:extLst>
+              <a:ext uri="{FF2B5EF4-FFF2-40B4-BE49-F238E27FC236}">
+                <a16:creationId xmlns:a16="http://schemas.microsoft.com/office/drawing/2014/main" id="{04D379BB-0D6F-C7F6-882B-F05C3445EF6B}"/>
               </a:ext>
             </a:extLst>
           </p:cNvPr>
@@ -5528,20 +5217,25 @@
         </p:blipFill>
         <p:spPr>
           <a:xfrm>
-            <a:off x="255458" y="3567795"/>
-            <a:ext cx="3033908" cy="3096171"/>
-          </a:xfrm>
-          <a:prstGeom prst="rect">
-            <a:avLst/>
-          </a:prstGeom>
+            <a:off x="110395" y="3429000"/>
+            <a:ext cx="1822704" cy="1518920"/>
+          </a:xfrm>
+          <a:prstGeom prst="rect">
+            <a:avLst/>
+          </a:prstGeom>
+          <a:ln>
+            <a:solidFill>
+              <a:schemeClr val="tx1"/>
+            </a:solidFill>
+          </a:ln>
         </p:spPr>
       </p:pic>
       <p:pic>
         <p:nvPicPr>
-          <p:cNvPr id="17" name="Picture 16">
-            <a:extLst>
-              <a:ext uri="{FF2B5EF4-FFF2-40B4-BE49-F238E27FC236}">
-                <a16:creationId xmlns:a16="http://schemas.microsoft.com/office/drawing/2014/main" id="{BB0281A9-6259-62D3-F7E1-C7882B482FB0}"/>
+          <p:cNvPr id="20" name="Picture 19">
+            <a:extLst>
+              <a:ext uri="{FF2B5EF4-FFF2-40B4-BE49-F238E27FC236}">
+                <a16:creationId xmlns:a16="http://schemas.microsoft.com/office/drawing/2014/main" id="{FE88A9D2-D499-2495-D079-4F1B0013B6F1}"/>
               </a:ext>
             </a:extLst>
           </p:cNvPr>
@@ -5558,20 +5252,25 @@
         </p:blipFill>
         <p:spPr>
           <a:xfrm>
-            <a:off x="3738854" y="3567794"/>
-            <a:ext cx="3033909" cy="3096172"/>
-          </a:xfrm>
-          <a:prstGeom prst="rect">
-            <a:avLst/>
-          </a:prstGeom>
+            <a:off x="2015344" y="3429000"/>
+            <a:ext cx="1794224" cy="1518920"/>
+          </a:xfrm>
+          <a:prstGeom prst="rect">
+            <a:avLst/>
+          </a:prstGeom>
+          <a:ln>
+            <a:solidFill>
+              <a:schemeClr val="tx1"/>
+            </a:solidFill>
+          </a:ln>
         </p:spPr>
       </p:pic>
       <p:pic>
         <p:nvPicPr>
-          <p:cNvPr id="19" name="Picture 18">
-            <a:extLst>
-              <a:ext uri="{FF2B5EF4-FFF2-40B4-BE49-F238E27FC236}">
-                <a16:creationId xmlns:a16="http://schemas.microsoft.com/office/drawing/2014/main" id="{8F69FCCA-573F-6C6F-4234-0F75098C4CEB}"/>
+          <p:cNvPr id="24" name="Picture 23">
+            <a:extLst>
+              <a:ext uri="{FF2B5EF4-FFF2-40B4-BE49-F238E27FC236}">
+                <a16:creationId xmlns:a16="http://schemas.microsoft.com/office/drawing/2014/main" id="{CF14F75F-E012-3D56-AA7C-BC252A3F7FBF}"/>
               </a:ext>
             </a:extLst>
           </p:cNvPr>
@@ -5588,8 +5287,617 @@
         </p:blipFill>
         <p:spPr>
           <a:xfrm>
-            <a:off x="8317813" y="3429000"/>
-            <a:ext cx="3795631" cy="3370882"/>
+            <a:off x="3898099" y="3429000"/>
+            <a:ext cx="1848019" cy="1518920"/>
+          </a:xfrm>
+          <a:prstGeom prst="rect">
+            <a:avLst/>
+          </a:prstGeom>
+          <a:ln>
+            <a:solidFill>
+              <a:schemeClr val="tx1"/>
+            </a:solidFill>
+          </a:ln>
+        </p:spPr>
+      </p:pic>
+      <p:pic>
+        <p:nvPicPr>
+          <p:cNvPr id="28" name="Picture 27">
+            <a:extLst>
+              <a:ext uri="{FF2B5EF4-FFF2-40B4-BE49-F238E27FC236}">
+                <a16:creationId xmlns:a16="http://schemas.microsoft.com/office/drawing/2014/main" id="{68E6FA8C-CA6C-441B-1FCE-000BE208C9D8}"/>
+              </a:ext>
+            </a:extLst>
+          </p:cNvPr>
+          <p:cNvPicPr>
+            <a:picLocks noChangeAspect="1"/>
+          </p:cNvPicPr>
+          <p:nvPr/>
+        </p:nvPicPr>
+        <p:blipFill>
+          <a:blip r:embed="rId8"/>
+          <a:stretch>
+            <a:fillRect/>
+          </a:stretch>
+        </p:blipFill>
+        <p:spPr>
+          <a:xfrm>
+            <a:off x="5830214" y="3429000"/>
+            <a:ext cx="1822704" cy="1518920"/>
+          </a:xfrm>
+          <a:prstGeom prst="rect">
+            <a:avLst/>
+          </a:prstGeom>
+          <a:ln>
+            <a:solidFill>
+              <a:schemeClr val="tx1"/>
+            </a:solidFill>
+          </a:ln>
+        </p:spPr>
+      </p:pic>
+      <p:pic>
+        <p:nvPicPr>
+          <p:cNvPr id="32" name="Picture 31">
+            <a:extLst>
+              <a:ext uri="{FF2B5EF4-FFF2-40B4-BE49-F238E27FC236}">
+                <a16:creationId xmlns:a16="http://schemas.microsoft.com/office/drawing/2014/main" id="{835A2D16-7E15-F550-A78B-2D0361AB7205}"/>
+              </a:ext>
+            </a:extLst>
+          </p:cNvPr>
+          <p:cNvPicPr>
+            <a:picLocks noChangeAspect="1"/>
+          </p:cNvPicPr>
+          <p:nvPr/>
+        </p:nvPicPr>
+        <p:blipFill>
+          <a:blip r:embed="rId9"/>
+          <a:stretch>
+            <a:fillRect/>
+          </a:stretch>
+        </p:blipFill>
+        <p:spPr>
+          <a:xfrm>
+            <a:off x="7737014" y="3429000"/>
+            <a:ext cx="1822704" cy="1518920"/>
+          </a:xfrm>
+          <a:prstGeom prst="rect">
+            <a:avLst/>
+          </a:prstGeom>
+          <a:ln>
+            <a:solidFill>
+              <a:schemeClr val="tx1"/>
+            </a:solidFill>
+          </a:ln>
+        </p:spPr>
+      </p:pic>
+      <p:pic>
+        <p:nvPicPr>
+          <p:cNvPr id="34" name="Picture 33">
+            <a:extLst>
+              <a:ext uri="{FF2B5EF4-FFF2-40B4-BE49-F238E27FC236}">
+                <a16:creationId xmlns:a16="http://schemas.microsoft.com/office/drawing/2014/main" id="{4606421B-32E3-6F76-0948-4E74029B74C4}"/>
+              </a:ext>
+            </a:extLst>
+          </p:cNvPr>
+          <p:cNvPicPr>
+            <a:picLocks noChangeAspect="1"/>
+          </p:cNvPicPr>
+          <p:nvPr/>
+        </p:nvPicPr>
+        <p:blipFill>
+          <a:blip r:embed="rId10"/>
+          <a:stretch>
+            <a:fillRect/>
+          </a:stretch>
+        </p:blipFill>
+        <p:spPr>
+          <a:xfrm>
+            <a:off x="65189" y="5176520"/>
+            <a:ext cx="1822704" cy="1518920"/>
+          </a:xfrm>
+          <a:prstGeom prst="rect">
+            <a:avLst/>
+          </a:prstGeom>
+          <a:ln>
+            <a:solidFill>
+              <a:schemeClr val="tx1"/>
+            </a:solidFill>
+          </a:ln>
+        </p:spPr>
+      </p:pic>
+      <p:pic>
+        <p:nvPicPr>
+          <p:cNvPr id="36" name="Picture 35">
+            <a:extLst>
+              <a:ext uri="{FF2B5EF4-FFF2-40B4-BE49-F238E27FC236}">
+                <a16:creationId xmlns:a16="http://schemas.microsoft.com/office/drawing/2014/main" id="{8295041D-F13C-092D-CA1D-1ABD09634E30}"/>
+              </a:ext>
+            </a:extLst>
+          </p:cNvPr>
+          <p:cNvPicPr>
+            <a:picLocks noChangeAspect="1"/>
+          </p:cNvPicPr>
+          <p:nvPr/>
+        </p:nvPicPr>
+        <p:blipFill>
+          <a:blip r:embed="rId11"/>
+          <a:stretch>
+            <a:fillRect/>
+          </a:stretch>
+        </p:blipFill>
+        <p:spPr>
+          <a:xfrm>
+            <a:off x="1986864" y="5176520"/>
+            <a:ext cx="1822704" cy="1518920"/>
+          </a:xfrm>
+          <a:prstGeom prst="rect">
+            <a:avLst/>
+          </a:prstGeom>
+          <a:ln>
+            <a:solidFill>
+              <a:schemeClr val="tx1"/>
+            </a:solidFill>
+          </a:ln>
+        </p:spPr>
+      </p:pic>
+      <p:pic>
+        <p:nvPicPr>
+          <p:cNvPr id="38" name="Picture 37">
+            <a:extLst>
+              <a:ext uri="{FF2B5EF4-FFF2-40B4-BE49-F238E27FC236}">
+                <a16:creationId xmlns:a16="http://schemas.microsoft.com/office/drawing/2014/main" id="{7DBAD0EE-36CB-54AC-323C-A4E295934A80}"/>
+              </a:ext>
+            </a:extLst>
+          </p:cNvPr>
+          <p:cNvPicPr>
+            <a:picLocks noChangeAspect="1"/>
+          </p:cNvPicPr>
+          <p:nvPr/>
+        </p:nvPicPr>
+        <p:blipFill>
+          <a:blip r:embed="rId12"/>
+          <a:stretch>
+            <a:fillRect/>
+          </a:stretch>
+        </p:blipFill>
+        <p:spPr>
+          <a:xfrm>
+            <a:off x="3908539" y="5176520"/>
+            <a:ext cx="1822704" cy="1518920"/>
+          </a:xfrm>
+          <a:prstGeom prst="rect">
+            <a:avLst/>
+          </a:prstGeom>
+          <a:ln>
+            <a:solidFill>
+              <a:schemeClr val="tx1"/>
+            </a:solidFill>
+          </a:ln>
+        </p:spPr>
+      </p:pic>
+      <p:pic>
+        <p:nvPicPr>
+          <p:cNvPr id="40" name="Picture 39">
+            <a:extLst>
+              <a:ext uri="{FF2B5EF4-FFF2-40B4-BE49-F238E27FC236}">
+                <a16:creationId xmlns:a16="http://schemas.microsoft.com/office/drawing/2014/main" id="{3AD5397E-D8B4-9B9B-F7D1-82A9B6A415DA}"/>
+              </a:ext>
+            </a:extLst>
+          </p:cNvPr>
+          <p:cNvPicPr>
+            <a:picLocks noChangeAspect="1"/>
+          </p:cNvPicPr>
+          <p:nvPr/>
+        </p:nvPicPr>
+        <p:blipFill>
+          <a:blip r:embed="rId13"/>
+          <a:stretch>
+            <a:fillRect/>
+          </a:stretch>
+        </p:blipFill>
+        <p:spPr>
+          <a:xfrm>
+            <a:off x="5830214" y="5176520"/>
+            <a:ext cx="1848019" cy="1518920"/>
+          </a:xfrm>
+          <a:prstGeom prst="rect">
+            <a:avLst/>
+          </a:prstGeom>
+          <a:ln>
+            <a:solidFill>
+              <a:schemeClr val="tx1"/>
+            </a:solidFill>
+          </a:ln>
+        </p:spPr>
+      </p:pic>
+      <p:pic>
+        <p:nvPicPr>
+          <p:cNvPr id="42" name="Picture 41">
+            <a:extLst>
+              <a:ext uri="{FF2B5EF4-FFF2-40B4-BE49-F238E27FC236}">
+                <a16:creationId xmlns:a16="http://schemas.microsoft.com/office/drawing/2014/main" id="{7023A9CB-2305-6714-7379-F17A45B420B1}"/>
+              </a:ext>
+            </a:extLst>
+          </p:cNvPr>
+          <p:cNvPicPr>
+            <a:picLocks noChangeAspect="1"/>
+          </p:cNvPicPr>
+          <p:nvPr/>
+        </p:nvPicPr>
+        <p:blipFill>
+          <a:blip r:embed="rId14"/>
+          <a:stretch>
+            <a:fillRect/>
+          </a:stretch>
+        </p:blipFill>
+        <p:spPr>
+          <a:xfrm>
+            <a:off x="7777205" y="5176520"/>
+            <a:ext cx="2427932" cy="1538909"/>
+          </a:xfrm>
+          <a:prstGeom prst="rect">
+            <a:avLst/>
+          </a:prstGeom>
+        </p:spPr>
+      </p:pic>
+    </p:spTree>
+    <p:extLst>
+      <p:ext uri="{BB962C8B-B14F-4D97-AF65-F5344CB8AC3E}">
+        <p14:creationId xmlns:p14="http://schemas.microsoft.com/office/powerpoint/2010/main" val="2936499389"/>
+      </p:ext>
+    </p:extLst>
+  </p:cSld>
+  <p:clrMapOvr>
+    <a:masterClrMapping/>
+  </p:clrMapOvr>
+</p:sld>
+</file>
+
+<file path=ppt/slides/slide7.xml><?xml version="1.0" encoding="utf-8"?>
+<p:sld xmlns:a="http://schemas.openxmlformats.org/drawingml/2006/main" xmlns:r="http://schemas.openxmlformats.org/officeDocument/2006/relationships" xmlns:p="http://schemas.openxmlformats.org/presentationml/2006/main">
+  <p:cSld>
+    <p:spTree>
+      <p:nvGrpSpPr>
+        <p:cNvPr id="1" name=""/>
+        <p:cNvGrpSpPr/>
+        <p:nvPr/>
+      </p:nvGrpSpPr>
+      <p:grpSpPr>
+        <a:xfrm>
+          <a:off x="0" y="0"/>
+          <a:ext cx="0" cy="0"/>
+          <a:chOff x="0" y="0"/>
+          <a:chExt cx="0" cy="0"/>
+        </a:xfrm>
+      </p:grpSpPr>
+      <p:sp>
+        <p:nvSpPr>
+          <p:cNvPr id="2" name="TextBox 1">
+            <a:extLst>
+              <a:ext uri="{FF2B5EF4-FFF2-40B4-BE49-F238E27FC236}">
+                <a16:creationId xmlns:a16="http://schemas.microsoft.com/office/drawing/2014/main" id="{8C64F1EC-1BB2-757D-FE20-A6EE22C6DCC5}"/>
+              </a:ext>
+            </a:extLst>
+          </p:cNvPr>
+          <p:cNvSpPr txBox="1"/>
+          <p:nvPr/>
+        </p:nvSpPr>
+        <p:spPr>
+          <a:xfrm>
+            <a:off x="0" y="0"/>
+            <a:ext cx="12191999" cy="523220"/>
+          </a:xfrm>
+          <a:prstGeom prst="rect">
+            <a:avLst/>
+          </a:prstGeom>
+          <a:noFill/>
+        </p:spPr>
+        <p:txBody>
+          <a:bodyPr wrap="square" rtlCol="0">
+            <a:spAutoFit/>
+          </a:bodyPr>
+          <a:lstStyle/>
+          <a:p>
+            <a:r>
+              <a:rPr lang="en-US" sz="2800" dirty="0"/>
+              <a:t>Random Forest w/ manual resampling to minority class [</a:t>
+            </a:r>
+            <a:r>
+              <a:rPr lang="en-US" sz="2800" dirty="0" err="1"/>
+              <a:t>df</a:t>
+            </a:r>
+            <a:r>
+              <a:rPr lang="en-US" sz="2800" dirty="0"/>
+              <a:t> = 300uA] </a:t>
+            </a:r>
+          </a:p>
+        </p:txBody>
+      </p:sp>
+      <p:sp>
+        <p:nvSpPr>
+          <p:cNvPr id="5" name="TextBox 4">
+            <a:extLst>
+              <a:ext uri="{FF2B5EF4-FFF2-40B4-BE49-F238E27FC236}">
+                <a16:creationId xmlns:a16="http://schemas.microsoft.com/office/drawing/2014/main" id="{4763F35E-2BBD-DCC3-26CF-CB01E32AC0B1}"/>
+              </a:ext>
+            </a:extLst>
+          </p:cNvPr>
+          <p:cNvSpPr txBox="1"/>
+          <p:nvPr/>
+        </p:nvSpPr>
+        <p:spPr>
+          <a:xfrm>
+            <a:off x="0" y="615553"/>
+            <a:ext cx="12191999" cy="830997"/>
+          </a:xfrm>
+          <a:prstGeom prst="rect">
+            <a:avLst/>
+          </a:prstGeom>
+          <a:noFill/>
+        </p:spPr>
+        <p:txBody>
+          <a:bodyPr wrap="square" rtlCol="0">
+            <a:spAutoFit/>
+          </a:bodyPr>
+          <a:lstStyle/>
+          <a:p>
+            <a:r>
+              <a:rPr lang="en-US" sz="1600" dirty="0"/>
+              <a:t>Features: ['Trial#','Lever','LeverZmax','LeverZmin','LeverAUC','HLZmax','HLZmin','HLAUC','NextLever’]</a:t>
+            </a:r>
+          </a:p>
+          <a:p>
+            <a:r>
+              <a:rPr lang="en-US" sz="1600" dirty="0"/>
+              <a:t>Due to imbalance within the </a:t>
+            </a:r>
+            <a:r>
+              <a:rPr lang="en-US" sz="1600" dirty="0" err="1"/>
+              <a:t>NextLever</a:t>
+            </a:r>
+            <a:r>
+              <a:rPr lang="en-US" sz="1600" dirty="0"/>
+              <a:t> classes (small=109, large = 678), I </a:t>
+            </a:r>
+            <a:r>
+              <a:rPr lang="en-US" sz="1600" dirty="0" err="1"/>
+              <a:t>downsampled</a:t>
+            </a:r>
+            <a:r>
+              <a:rPr lang="en-US" sz="1600" dirty="0"/>
+              <a:t> </a:t>
+            </a:r>
+            <a:r>
+              <a:rPr lang="en-US" sz="1600" dirty="0" err="1"/>
+              <a:t>NextLever</a:t>
+            </a:r>
+            <a:r>
+              <a:rPr lang="en-US" sz="1600" dirty="0"/>
+              <a:t>=1 to be the size of </a:t>
+            </a:r>
+            <a:r>
+              <a:rPr lang="en-US" sz="1600" dirty="0" err="1"/>
+              <a:t>NextLever</a:t>
+            </a:r>
+            <a:r>
+              <a:rPr lang="en-US" sz="1600" dirty="0"/>
+              <a:t>=0 (109)</a:t>
+            </a:r>
+          </a:p>
+          <a:p>
+            <a:r>
+              <a:rPr lang="en-US" sz="1600" dirty="0"/>
+              <a:t>rf = </a:t>
+            </a:r>
+            <a:r>
+              <a:rPr lang="en-US" sz="1600" dirty="0" err="1"/>
+              <a:t>RandomForestClassifier</a:t>
+            </a:r>
+            <a:r>
+              <a:rPr lang="en-US" sz="1600" dirty="0"/>
+              <a:t>(</a:t>
+            </a:r>
+            <a:r>
+              <a:rPr lang="en-US" sz="1600" dirty="0" err="1"/>
+              <a:t>n_estimators</a:t>
+            </a:r>
+            <a:r>
+              <a:rPr lang="en-US" sz="1600" dirty="0"/>
+              <a:t>=100, </a:t>
+            </a:r>
+            <a:r>
+              <a:rPr lang="en-US" sz="1600" dirty="0" err="1"/>
+              <a:t>random_state</a:t>
+            </a:r>
+            <a:r>
+              <a:rPr lang="en-US" sz="1600" dirty="0"/>
+              <a:t>=42, </a:t>
+            </a:r>
+            <a:r>
+              <a:rPr lang="en-US" sz="1600" dirty="0" err="1"/>
+              <a:t>class_weight</a:t>
+            </a:r>
+            <a:r>
+              <a:rPr lang="en-US" sz="1600" dirty="0"/>
+              <a:t>='balanced')</a:t>
+            </a:r>
+          </a:p>
+        </p:txBody>
+      </p:sp>
+      <p:pic>
+        <p:nvPicPr>
+          <p:cNvPr id="6" name="Picture 5">
+            <a:extLst>
+              <a:ext uri="{FF2B5EF4-FFF2-40B4-BE49-F238E27FC236}">
+                <a16:creationId xmlns:a16="http://schemas.microsoft.com/office/drawing/2014/main" id="{F1C3A436-99B4-72EB-53F4-0BAE1C011A31}"/>
+              </a:ext>
+            </a:extLst>
+          </p:cNvPr>
+          <p:cNvPicPr>
+            <a:picLocks noChangeAspect="1"/>
+          </p:cNvPicPr>
+          <p:nvPr/>
+        </p:nvPicPr>
+        <p:blipFill>
+          <a:blip r:embed="rId2"/>
+          <a:stretch>
+            <a:fillRect/>
+          </a:stretch>
+        </p:blipFill>
+        <p:spPr>
+          <a:xfrm>
+            <a:off x="152166" y="1538883"/>
+            <a:ext cx="3353268" cy="2143424"/>
+          </a:xfrm>
+          <a:prstGeom prst="rect">
+            <a:avLst/>
+          </a:prstGeom>
+        </p:spPr>
+      </p:pic>
+      <p:pic>
+        <p:nvPicPr>
+          <p:cNvPr id="9" name="Picture 8">
+            <a:extLst>
+              <a:ext uri="{FF2B5EF4-FFF2-40B4-BE49-F238E27FC236}">
+                <a16:creationId xmlns:a16="http://schemas.microsoft.com/office/drawing/2014/main" id="{BD48F232-2ECA-3B52-0972-1B12EAC84B24}"/>
+              </a:ext>
+            </a:extLst>
+          </p:cNvPr>
+          <p:cNvPicPr>
+            <a:picLocks noChangeAspect="1"/>
+          </p:cNvPicPr>
+          <p:nvPr/>
+        </p:nvPicPr>
+        <p:blipFill>
+          <a:blip r:embed="rId3"/>
+          <a:stretch>
+            <a:fillRect/>
+          </a:stretch>
+        </p:blipFill>
+        <p:spPr>
+          <a:xfrm>
+            <a:off x="3616883" y="1446551"/>
+            <a:ext cx="2874352" cy="2239702"/>
+          </a:xfrm>
+          <a:prstGeom prst="rect">
+            <a:avLst/>
+          </a:prstGeom>
+        </p:spPr>
+      </p:pic>
+      <p:pic>
+        <p:nvPicPr>
+          <p:cNvPr id="11" name="Picture 10">
+            <a:extLst>
+              <a:ext uri="{FF2B5EF4-FFF2-40B4-BE49-F238E27FC236}">
+                <a16:creationId xmlns:a16="http://schemas.microsoft.com/office/drawing/2014/main" id="{23C38F55-9692-EB2E-040D-D6174C61FBD4}"/>
+              </a:ext>
+            </a:extLst>
+          </p:cNvPr>
+          <p:cNvPicPr>
+            <a:picLocks noChangeAspect="1"/>
+          </p:cNvPicPr>
+          <p:nvPr/>
+        </p:nvPicPr>
+        <p:blipFill>
+          <a:blip r:embed="rId4"/>
+          <a:stretch>
+            <a:fillRect/>
+          </a:stretch>
+        </p:blipFill>
+        <p:spPr>
+          <a:xfrm>
+            <a:off x="6602684" y="1446551"/>
+            <a:ext cx="3353268" cy="2396312"/>
+          </a:xfrm>
+          <a:prstGeom prst="rect">
+            <a:avLst/>
+          </a:prstGeom>
+        </p:spPr>
+      </p:pic>
+      <p:pic>
+        <p:nvPicPr>
+          <p:cNvPr id="14" name="Picture 13">
+            <a:extLst>
+              <a:ext uri="{FF2B5EF4-FFF2-40B4-BE49-F238E27FC236}">
+                <a16:creationId xmlns:a16="http://schemas.microsoft.com/office/drawing/2014/main" id="{B7296D0F-2CF9-4BC8-DC86-B84F8DCB384A}"/>
+              </a:ext>
+            </a:extLst>
+          </p:cNvPr>
+          <p:cNvPicPr>
+            <a:picLocks noChangeAspect="1"/>
+          </p:cNvPicPr>
+          <p:nvPr/>
+        </p:nvPicPr>
+        <p:blipFill>
+          <a:blip r:embed="rId5"/>
+          <a:stretch>
+            <a:fillRect/>
+          </a:stretch>
+        </p:blipFill>
+        <p:spPr>
+          <a:xfrm>
+            <a:off x="152469" y="3817860"/>
+            <a:ext cx="1595200" cy="1329333"/>
+          </a:xfrm>
+          <a:prstGeom prst="rect">
+            <a:avLst/>
+          </a:prstGeom>
+        </p:spPr>
+      </p:pic>
+      <p:pic>
+        <p:nvPicPr>
+          <p:cNvPr id="17" name="Picture 16">
+            <a:extLst>
+              <a:ext uri="{FF2B5EF4-FFF2-40B4-BE49-F238E27FC236}">
+                <a16:creationId xmlns:a16="http://schemas.microsoft.com/office/drawing/2014/main" id="{D624A70F-BB85-4228-2514-2C909C3BA191}"/>
+              </a:ext>
+            </a:extLst>
+          </p:cNvPr>
+          <p:cNvPicPr>
+            <a:picLocks noChangeAspect="1"/>
+          </p:cNvPicPr>
+          <p:nvPr/>
+        </p:nvPicPr>
+        <p:blipFill>
+          <a:blip r:embed="rId6"/>
+          <a:stretch>
+            <a:fillRect/>
+          </a:stretch>
+        </p:blipFill>
+        <p:spPr>
+          <a:xfrm>
+            <a:off x="1859118" y="3817860"/>
+            <a:ext cx="1570275" cy="1329333"/>
+          </a:xfrm>
+          <a:prstGeom prst="rect">
+            <a:avLst/>
+          </a:prstGeom>
+        </p:spPr>
+      </p:pic>
+      <p:pic>
+        <p:nvPicPr>
+          <p:cNvPr id="19" name="Picture 18">
+            <a:extLst>
+              <a:ext uri="{FF2B5EF4-FFF2-40B4-BE49-F238E27FC236}">
+                <a16:creationId xmlns:a16="http://schemas.microsoft.com/office/drawing/2014/main" id="{19FFACBD-B702-B264-0CF2-06F0C59B097B}"/>
+              </a:ext>
+            </a:extLst>
+          </p:cNvPr>
+          <p:cNvPicPr>
+            <a:picLocks noChangeAspect="1"/>
+          </p:cNvPicPr>
+          <p:nvPr/>
+        </p:nvPicPr>
+        <p:blipFill>
+          <a:blip r:embed="rId7"/>
+          <a:stretch>
+            <a:fillRect/>
+          </a:stretch>
+        </p:blipFill>
+        <p:spPr>
+          <a:xfrm>
+            <a:off x="3602020" y="3817859"/>
+            <a:ext cx="1595200" cy="1329333"/>
           </a:xfrm>
           <a:prstGeom prst="rect">
             <a:avLst/>
@@ -5601,7 +5909,7 @@
           <p:cNvPr id="22" name="Picture 21">
             <a:extLst>
               <a:ext uri="{FF2B5EF4-FFF2-40B4-BE49-F238E27FC236}">
-                <a16:creationId xmlns:a16="http://schemas.microsoft.com/office/drawing/2014/main" id="{D6A2C402-887B-2874-B84D-D074C7B6F55A}"/>
+                <a16:creationId xmlns:a16="http://schemas.microsoft.com/office/drawing/2014/main" id="{8594F0AC-AE61-6160-203C-4EA38A7DE2F0}"/>
               </a:ext>
             </a:extLst>
           </p:cNvPr>
@@ -5612,6 +5920,973 @@
         </p:nvPicPr>
         <p:blipFill>
           <a:blip r:embed="rId8"/>
+          <a:stretch>
+            <a:fillRect/>
+          </a:stretch>
+        </p:blipFill>
+        <p:spPr>
+          <a:xfrm>
+            <a:off x="5283744" y="3816864"/>
+            <a:ext cx="1595200" cy="1329333"/>
+          </a:xfrm>
+          <a:prstGeom prst="rect">
+            <a:avLst/>
+          </a:prstGeom>
+        </p:spPr>
+      </p:pic>
+      <p:pic>
+        <p:nvPicPr>
+          <p:cNvPr id="25" name="Picture 24">
+            <a:extLst>
+              <a:ext uri="{FF2B5EF4-FFF2-40B4-BE49-F238E27FC236}">
+                <a16:creationId xmlns:a16="http://schemas.microsoft.com/office/drawing/2014/main" id="{CD508024-BC39-02EA-D50F-B77AA210F7DE}"/>
+              </a:ext>
+            </a:extLst>
+          </p:cNvPr>
+          <p:cNvPicPr>
+            <a:picLocks noChangeAspect="1"/>
+          </p:cNvPicPr>
+          <p:nvPr/>
+        </p:nvPicPr>
+        <p:blipFill>
+          <a:blip r:embed="rId9"/>
+          <a:stretch>
+            <a:fillRect/>
+          </a:stretch>
+        </p:blipFill>
+        <p:spPr>
+          <a:xfrm>
+            <a:off x="7138095" y="3842863"/>
+            <a:ext cx="1595200" cy="1329333"/>
+          </a:xfrm>
+          <a:prstGeom prst="rect">
+            <a:avLst/>
+          </a:prstGeom>
+        </p:spPr>
+      </p:pic>
+      <p:pic>
+        <p:nvPicPr>
+          <p:cNvPr id="27" name="Picture 26">
+            <a:extLst>
+              <a:ext uri="{FF2B5EF4-FFF2-40B4-BE49-F238E27FC236}">
+                <a16:creationId xmlns:a16="http://schemas.microsoft.com/office/drawing/2014/main" id="{62A537D2-3FC9-24B4-1711-A29486B5CC37}"/>
+              </a:ext>
+            </a:extLst>
+          </p:cNvPr>
+          <p:cNvPicPr>
+            <a:picLocks noChangeAspect="1"/>
+          </p:cNvPicPr>
+          <p:nvPr/>
+        </p:nvPicPr>
+        <p:blipFill>
+          <a:blip r:embed="rId10"/>
+          <a:stretch>
+            <a:fillRect/>
+          </a:stretch>
+        </p:blipFill>
+        <p:spPr>
+          <a:xfrm>
+            <a:off x="152469" y="5319116"/>
+            <a:ext cx="1595200" cy="1329333"/>
+          </a:xfrm>
+          <a:prstGeom prst="rect">
+            <a:avLst/>
+          </a:prstGeom>
+        </p:spPr>
+      </p:pic>
+      <p:pic>
+        <p:nvPicPr>
+          <p:cNvPr id="30" name="Picture 29">
+            <a:extLst>
+              <a:ext uri="{FF2B5EF4-FFF2-40B4-BE49-F238E27FC236}">
+                <a16:creationId xmlns:a16="http://schemas.microsoft.com/office/drawing/2014/main" id="{E547E840-E195-B34E-DAA7-5FBF9ED455C8}"/>
+              </a:ext>
+            </a:extLst>
+          </p:cNvPr>
+          <p:cNvPicPr>
+            <a:picLocks noChangeAspect="1"/>
+          </p:cNvPicPr>
+          <p:nvPr/>
+        </p:nvPicPr>
+        <p:blipFill>
+          <a:blip r:embed="rId11"/>
+          <a:stretch>
+            <a:fillRect/>
+          </a:stretch>
+        </p:blipFill>
+        <p:spPr>
+          <a:xfrm>
+            <a:off x="1859118" y="5319117"/>
+            <a:ext cx="1595200" cy="1329333"/>
+          </a:xfrm>
+          <a:prstGeom prst="rect">
+            <a:avLst/>
+          </a:prstGeom>
+        </p:spPr>
+      </p:pic>
+      <p:pic>
+        <p:nvPicPr>
+          <p:cNvPr id="33" name="Picture 32">
+            <a:extLst>
+              <a:ext uri="{FF2B5EF4-FFF2-40B4-BE49-F238E27FC236}">
+                <a16:creationId xmlns:a16="http://schemas.microsoft.com/office/drawing/2014/main" id="{3C5D45E6-DDAC-71CD-F092-7F5FED4E1F14}"/>
+              </a:ext>
+            </a:extLst>
+          </p:cNvPr>
+          <p:cNvPicPr>
+            <a:picLocks noChangeAspect="1"/>
+          </p:cNvPicPr>
+          <p:nvPr/>
+        </p:nvPicPr>
+        <p:blipFill>
+          <a:blip r:embed="rId12"/>
+          <a:stretch>
+            <a:fillRect/>
+          </a:stretch>
+        </p:blipFill>
+        <p:spPr>
+          <a:xfrm>
+            <a:off x="3616883" y="5319115"/>
+            <a:ext cx="1595200" cy="1329333"/>
+          </a:xfrm>
+          <a:prstGeom prst="rect">
+            <a:avLst/>
+          </a:prstGeom>
+        </p:spPr>
+      </p:pic>
+    </p:spTree>
+    <p:extLst>
+      <p:ext uri="{BB962C8B-B14F-4D97-AF65-F5344CB8AC3E}">
+        <p14:creationId xmlns:p14="http://schemas.microsoft.com/office/powerpoint/2010/main" val="1516434053"/>
+      </p:ext>
+    </p:extLst>
+  </p:cSld>
+  <p:clrMapOvr>
+    <a:masterClrMapping/>
+  </p:clrMapOvr>
+</p:sld>
+</file>
+
+<file path=ppt/slides/slide8.xml><?xml version="1.0" encoding="utf-8"?>
+<p:sld xmlns:a="http://schemas.openxmlformats.org/drawingml/2006/main" xmlns:r="http://schemas.openxmlformats.org/officeDocument/2006/relationships" xmlns:p="http://schemas.openxmlformats.org/presentationml/2006/main">
+  <p:cSld>
+    <p:spTree>
+      <p:nvGrpSpPr>
+        <p:cNvPr id="1" name=""/>
+        <p:cNvGrpSpPr/>
+        <p:nvPr/>
+      </p:nvGrpSpPr>
+      <p:grpSpPr>
+        <a:xfrm>
+          <a:off x="0" y="0"/>
+          <a:ext cx="0" cy="0"/>
+          <a:chOff x="0" y="0"/>
+          <a:chExt cx="0" cy="0"/>
+        </a:xfrm>
+      </p:grpSpPr>
+      <p:sp>
+        <p:nvSpPr>
+          <p:cNvPr id="2" name="TextBox 1">
+            <a:extLst>
+              <a:ext uri="{FF2B5EF4-FFF2-40B4-BE49-F238E27FC236}">
+                <a16:creationId xmlns:a16="http://schemas.microsoft.com/office/drawing/2014/main" id="{8C64F1EC-1BB2-757D-FE20-A6EE22C6DCC5}"/>
+              </a:ext>
+            </a:extLst>
+          </p:cNvPr>
+          <p:cNvSpPr txBox="1"/>
+          <p:nvPr/>
+        </p:nvSpPr>
+        <p:spPr>
+          <a:xfrm>
+            <a:off x="0" y="0"/>
+            <a:ext cx="12191999" cy="523220"/>
+          </a:xfrm>
+          <a:prstGeom prst="rect">
+            <a:avLst/>
+          </a:prstGeom>
+          <a:noFill/>
+        </p:spPr>
+        <p:txBody>
+          <a:bodyPr wrap="square" rtlCol="0">
+            <a:spAutoFit/>
+          </a:bodyPr>
+          <a:lstStyle/>
+          <a:p>
+            <a:r>
+              <a:rPr lang="en-US" sz="2800" dirty="0"/>
+              <a:t>Random Forest w/ manual resampling to minority class [</a:t>
+            </a:r>
+            <a:r>
+              <a:rPr lang="en-US" sz="2800" dirty="0" err="1"/>
+              <a:t>df</a:t>
+            </a:r>
+            <a:r>
+              <a:rPr lang="en-US" sz="2800" dirty="0"/>
+              <a:t> = 300uA] </a:t>
+            </a:r>
+          </a:p>
+        </p:txBody>
+      </p:sp>
+      <p:sp>
+        <p:nvSpPr>
+          <p:cNvPr id="5" name="TextBox 4">
+            <a:extLst>
+              <a:ext uri="{FF2B5EF4-FFF2-40B4-BE49-F238E27FC236}">
+                <a16:creationId xmlns:a16="http://schemas.microsoft.com/office/drawing/2014/main" id="{4763F35E-2BBD-DCC3-26CF-CB01E32AC0B1}"/>
+              </a:ext>
+            </a:extLst>
+          </p:cNvPr>
+          <p:cNvSpPr txBox="1"/>
+          <p:nvPr/>
+        </p:nvSpPr>
+        <p:spPr>
+          <a:xfrm>
+            <a:off x="0" y="615553"/>
+            <a:ext cx="12191999" cy="830997"/>
+          </a:xfrm>
+          <a:prstGeom prst="rect">
+            <a:avLst/>
+          </a:prstGeom>
+          <a:noFill/>
+        </p:spPr>
+        <p:txBody>
+          <a:bodyPr wrap="square" rtlCol="0">
+            <a:spAutoFit/>
+          </a:bodyPr>
+          <a:lstStyle/>
+          <a:p>
+            <a:r>
+              <a:rPr lang="en-US" sz="1600" dirty="0"/>
+              <a:t>Features: ['LeverZmax','LeverZmin','LeverAUC','HLZmax','HLZmin','HLAUC','NextLever’]</a:t>
+            </a:r>
+          </a:p>
+          <a:p>
+            <a:r>
+              <a:rPr lang="en-US" sz="1600" dirty="0"/>
+              <a:t>Due to imbalance within the </a:t>
+            </a:r>
+            <a:r>
+              <a:rPr lang="en-US" sz="1600" dirty="0" err="1"/>
+              <a:t>NextLever</a:t>
+            </a:r>
+            <a:r>
+              <a:rPr lang="en-US" sz="1600" dirty="0"/>
+              <a:t> classes (small=109, large = 678), I </a:t>
+            </a:r>
+            <a:r>
+              <a:rPr lang="en-US" sz="1600" dirty="0" err="1"/>
+              <a:t>downsampled</a:t>
+            </a:r>
+            <a:r>
+              <a:rPr lang="en-US" sz="1600" dirty="0"/>
+              <a:t> </a:t>
+            </a:r>
+            <a:r>
+              <a:rPr lang="en-US" sz="1600" dirty="0" err="1"/>
+              <a:t>NextLever</a:t>
+            </a:r>
+            <a:r>
+              <a:rPr lang="en-US" sz="1600" dirty="0"/>
+              <a:t>=1 to be the size of </a:t>
+            </a:r>
+            <a:r>
+              <a:rPr lang="en-US" sz="1600" dirty="0" err="1"/>
+              <a:t>NextLever</a:t>
+            </a:r>
+            <a:r>
+              <a:rPr lang="en-US" sz="1600" dirty="0"/>
+              <a:t>=0 (109)</a:t>
+            </a:r>
+          </a:p>
+          <a:p>
+            <a:r>
+              <a:rPr lang="en-US" sz="1600" dirty="0"/>
+              <a:t>rf = </a:t>
+            </a:r>
+            <a:r>
+              <a:rPr lang="en-US" sz="1600" dirty="0" err="1"/>
+              <a:t>RandomForestClassifier</a:t>
+            </a:r>
+            <a:r>
+              <a:rPr lang="en-US" sz="1600" dirty="0"/>
+              <a:t>(</a:t>
+            </a:r>
+            <a:r>
+              <a:rPr lang="en-US" sz="1600" dirty="0" err="1"/>
+              <a:t>n_estimators</a:t>
+            </a:r>
+            <a:r>
+              <a:rPr lang="en-US" sz="1600" dirty="0"/>
+              <a:t>=100, </a:t>
+            </a:r>
+            <a:r>
+              <a:rPr lang="en-US" sz="1600" dirty="0" err="1"/>
+              <a:t>random_state</a:t>
+            </a:r>
+            <a:r>
+              <a:rPr lang="en-US" sz="1600" dirty="0"/>
+              <a:t>=42, </a:t>
+            </a:r>
+            <a:r>
+              <a:rPr lang="en-US" sz="1600" dirty="0" err="1"/>
+              <a:t>class_weight</a:t>
+            </a:r>
+            <a:r>
+              <a:rPr lang="en-US" sz="1600" dirty="0"/>
+              <a:t>='balanced')</a:t>
+            </a:r>
+          </a:p>
+        </p:txBody>
+      </p:sp>
+      <p:pic>
+        <p:nvPicPr>
+          <p:cNvPr id="4" name="Picture 3">
+            <a:extLst>
+              <a:ext uri="{FF2B5EF4-FFF2-40B4-BE49-F238E27FC236}">
+                <a16:creationId xmlns:a16="http://schemas.microsoft.com/office/drawing/2014/main" id="{9939A5EB-A949-EAA7-B1E7-07FEFA98818A}"/>
+              </a:ext>
+            </a:extLst>
+          </p:cNvPr>
+          <p:cNvPicPr>
+            <a:picLocks noChangeAspect="1"/>
+          </p:cNvPicPr>
+          <p:nvPr/>
+        </p:nvPicPr>
+        <p:blipFill>
+          <a:blip r:embed="rId2"/>
+          <a:stretch>
+            <a:fillRect/>
+          </a:stretch>
+        </p:blipFill>
+        <p:spPr>
+          <a:xfrm>
+            <a:off x="134603" y="1538883"/>
+            <a:ext cx="3375953" cy="2034716"/>
+          </a:xfrm>
+          <a:prstGeom prst="rect">
+            <a:avLst/>
+          </a:prstGeom>
+        </p:spPr>
+      </p:pic>
+      <p:pic>
+        <p:nvPicPr>
+          <p:cNvPr id="8" name="Picture 7">
+            <a:extLst>
+              <a:ext uri="{FF2B5EF4-FFF2-40B4-BE49-F238E27FC236}">
+                <a16:creationId xmlns:a16="http://schemas.microsoft.com/office/drawing/2014/main" id="{19ED9AD4-06C7-91F2-732A-B7A40D807BC9}"/>
+              </a:ext>
+            </a:extLst>
+          </p:cNvPr>
+          <p:cNvPicPr>
+            <a:picLocks noChangeAspect="1"/>
+          </p:cNvPicPr>
+          <p:nvPr/>
+        </p:nvPicPr>
+        <p:blipFill>
+          <a:blip r:embed="rId3"/>
+          <a:stretch>
+            <a:fillRect/>
+          </a:stretch>
+        </p:blipFill>
+        <p:spPr>
+          <a:xfrm>
+            <a:off x="3657794" y="1538884"/>
+            <a:ext cx="2640369" cy="2057382"/>
+          </a:xfrm>
+          <a:prstGeom prst="rect">
+            <a:avLst/>
+          </a:prstGeom>
+        </p:spPr>
+      </p:pic>
+      <p:pic>
+        <p:nvPicPr>
+          <p:cNvPr id="12" name="Picture 11">
+            <a:extLst>
+              <a:ext uri="{FF2B5EF4-FFF2-40B4-BE49-F238E27FC236}">
+                <a16:creationId xmlns:a16="http://schemas.microsoft.com/office/drawing/2014/main" id="{E1D0229A-E0B4-D448-460E-F3E1D070FB24}"/>
+              </a:ext>
+            </a:extLst>
+          </p:cNvPr>
+          <p:cNvPicPr>
+            <a:picLocks noChangeAspect="1"/>
+          </p:cNvPicPr>
+          <p:nvPr/>
+        </p:nvPicPr>
+        <p:blipFill>
+          <a:blip r:embed="rId4"/>
+          <a:stretch>
+            <a:fillRect/>
+          </a:stretch>
+        </p:blipFill>
+        <p:spPr>
+          <a:xfrm>
+            <a:off x="6614043" y="1538883"/>
+            <a:ext cx="2669674" cy="1890117"/>
+          </a:xfrm>
+          <a:prstGeom prst="rect">
+            <a:avLst/>
+          </a:prstGeom>
+        </p:spPr>
+      </p:pic>
+      <p:pic>
+        <p:nvPicPr>
+          <p:cNvPr id="15" name="Picture 14">
+            <a:extLst>
+              <a:ext uri="{FF2B5EF4-FFF2-40B4-BE49-F238E27FC236}">
+                <a16:creationId xmlns:a16="http://schemas.microsoft.com/office/drawing/2014/main" id="{DEA1B525-3E7F-677A-8D6D-BE50F007CC72}"/>
+              </a:ext>
+            </a:extLst>
+          </p:cNvPr>
+          <p:cNvPicPr>
+            <a:picLocks noChangeAspect="1"/>
+          </p:cNvPicPr>
+          <p:nvPr/>
+        </p:nvPicPr>
+        <p:blipFill>
+          <a:blip r:embed="rId5"/>
+          <a:stretch>
+            <a:fillRect/>
+          </a:stretch>
+        </p:blipFill>
+        <p:spPr>
+          <a:xfrm>
+            <a:off x="134603" y="3733817"/>
+            <a:ext cx="1604449" cy="1337041"/>
+          </a:xfrm>
+          <a:prstGeom prst="rect">
+            <a:avLst/>
+          </a:prstGeom>
+        </p:spPr>
+      </p:pic>
+      <p:pic>
+        <p:nvPicPr>
+          <p:cNvPr id="18" name="Picture 17">
+            <a:extLst>
+              <a:ext uri="{FF2B5EF4-FFF2-40B4-BE49-F238E27FC236}">
+                <a16:creationId xmlns:a16="http://schemas.microsoft.com/office/drawing/2014/main" id="{87F22420-5E7D-49F7-3030-BEA0AD15FDB5}"/>
+              </a:ext>
+            </a:extLst>
+          </p:cNvPr>
+          <p:cNvPicPr>
+            <a:picLocks noChangeAspect="1"/>
+          </p:cNvPicPr>
+          <p:nvPr/>
+        </p:nvPicPr>
+        <p:blipFill>
+          <a:blip r:embed="rId6"/>
+          <a:stretch>
+            <a:fillRect/>
+          </a:stretch>
+        </p:blipFill>
+        <p:spPr>
+          <a:xfrm>
+            <a:off x="1906107" y="3756485"/>
+            <a:ext cx="1604449" cy="1337041"/>
+          </a:xfrm>
+          <a:prstGeom prst="rect">
+            <a:avLst/>
+          </a:prstGeom>
+        </p:spPr>
+      </p:pic>
+      <p:pic>
+        <p:nvPicPr>
+          <p:cNvPr id="21" name="Picture 20">
+            <a:extLst>
+              <a:ext uri="{FF2B5EF4-FFF2-40B4-BE49-F238E27FC236}">
+                <a16:creationId xmlns:a16="http://schemas.microsoft.com/office/drawing/2014/main" id="{748AEA13-CDBD-3F62-F545-C42CC2BEB029}"/>
+              </a:ext>
+            </a:extLst>
+          </p:cNvPr>
+          <p:cNvPicPr>
+            <a:picLocks noChangeAspect="1"/>
+          </p:cNvPicPr>
+          <p:nvPr/>
+        </p:nvPicPr>
+        <p:blipFill>
+          <a:blip r:embed="rId7"/>
+          <a:stretch>
+            <a:fillRect/>
+          </a:stretch>
+        </p:blipFill>
+        <p:spPr>
+          <a:xfrm>
+            <a:off x="3657794" y="3756485"/>
+            <a:ext cx="1604449" cy="1337041"/>
+          </a:xfrm>
+          <a:prstGeom prst="rect">
+            <a:avLst/>
+          </a:prstGeom>
+        </p:spPr>
+      </p:pic>
+      <p:pic>
+        <p:nvPicPr>
+          <p:cNvPr id="24" name="Picture 23">
+            <a:extLst>
+              <a:ext uri="{FF2B5EF4-FFF2-40B4-BE49-F238E27FC236}">
+                <a16:creationId xmlns:a16="http://schemas.microsoft.com/office/drawing/2014/main" id="{21C200D0-F013-EFDE-B700-10A411446286}"/>
+              </a:ext>
+            </a:extLst>
+          </p:cNvPr>
+          <p:cNvPicPr>
+            <a:picLocks noChangeAspect="1"/>
+          </p:cNvPicPr>
+          <p:nvPr/>
+        </p:nvPicPr>
+        <p:blipFill>
+          <a:blip r:embed="rId8"/>
+          <a:stretch>
+            <a:fillRect/>
+          </a:stretch>
+        </p:blipFill>
+        <p:spPr>
+          <a:xfrm>
+            <a:off x="234327" y="5319116"/>
+            <a:ext cx="1626733" cy="1337041"/>
+          </a:xfrm>
+          <a:prstGeom prst="rect">
+            <a:avLst/>
+          </a:prstGeom>
+        </p:spPr>
+      </p:pic>
+      <p:pic>
+        <p:nvPicPr>
+          <p:cNvPr id="28" name="Picture 27">
+            <a:extLst>
+              <a:ext uri="{FF2B5EF4-FFF2-40B4-BE49-F238E27FC236}">
+                <a16:creationId xmlns:a16="http://schemas.microsoft.com/office/drawing/2014/main" id="{54221ADB-3E7C-9210-423E-0CDA81B2D084}"/>
+              </a:ext>
+            </a:extLst>
+          </p:cNvPr>
+          <p:cNvPicPr>
+            <a:picLocks noChangeAspect="1"/>
+          </p:cNvPicPr>
+          <p:nvPr/>
+        </p:nvPicPr>
+        <p:blipFill>
+          <a:blip r:embed="rId9"/>
+          <a:stretch>
+            <a:fillRect/>
+          </a:stretch>
+        </p:blipFill>
+        <p:spPr>
+          <a:xfrm>
+            <a:off x="1889063" y="5319116"/>
+            <a:ext cx="1604449" cy="1337041"/>
+          </a:xfrm>
+          <a:prstGeom prst="rect">
+            <a:avLst/>
+          </a:prstGeom>
+        </p:spPr>
+      </p:pic>
+      <p:pic>
+        <p:nvPicPr>
+          <p:cNvPr id="31" name="Picture 30">
+            <a:extLst>
+              <a:ext uri="{FF2B5EF4-FFF2-40B4-BE49-F238E27FC236}">
+                <a16:creationId xmlns:a16="http://schemas.microsoft.com/office/drawing/2014/main" id="{20BFFA78-478F-65FA-A90F-D50D6477A96A}"/>
+              </a:ext>
+            </a:extLst>
+          </p:cNvPr>
+          <p:cNvPicPr>
+            <a:picLocks noChangeAspect="1"/>
+          </p:cNvPicPr>
+          <p:nvPr/>
+        </p:nvPicPr>
+        <p:blipFill>
+          <a:blip r:embed="rId10"/>
+          <a:stretch>
+            <a:fillRect/>
+          </a:stretch>
+        </p:blipFill>
+        <p:spPr>
+          <a:xfrm>
+            <a:off x="3619110" y="5330450"/>
+            <a:ext cx="1604449" cy="1337041"/>
+          </a:xfrm>
+          <a:prstGeom prst="rect">
+            <a:avLst/>
+          </a:prstGeom>
+        </p:spPr>
+      </p:pic>
+    </p:spTree>
+    <p:extLst>
+      <p:ext uri="{BB962C8B-B14F-4D97-AF65-F5344CB8AC3E}">
+        <p14:creationId xmlns:p14="http://schemas.microsoft.com/office/powerpoint/2010/main" val="3584834807"/>
+      </p:ext>
+    </p:extLst>
+  </p:cSld>
+  <p:clrMapOvr>
+    <a:masterClrMapping/>
+  </p:clrMapOvr>
+</p:sld>
+</file>
+
+<file path=ppt/slides/slide9.xml><?xml version="1.0" encoding="utf-8"?>
+<p:sld xmlns:a="http://schemas.openxmlformats.org/drawingml/2006/main" xmlns:r="http://schemas.openxmlformats.org/officeDocument/2006/relationships" xmlns:p="http://schemas.openxmlformats.org/presentationml/2006/main">
+  <p:cSld>
+    <p:spTree>
+      <p:nvGrpSpPr>
+        <p:cNvPr id="1" name=""/>
+        <p:cNvGrpSpPr/>
+        <p:nvPr/>
+      </p:nvGrpSpPr>
+      <p:grpSpPr>
+        <a:xfrm>
+          <a:off x="0" y="0"/>
+          <a:ext cx="0" cy="0"/>
+          <a:chOff x="0" y="0"/>
+          <a:chExt cx="0" cy="0"/>
+        </a:xfrm>
+      </p:grpSpPr>
+      <p:sp>
+        <p:nvSpPr>
+          <p:cNvPr id="2" name="TextBox 1">
+            <a:extLst>
+              <a:ext uri="{FF2B5EF4-FFF2-40B4-BE49-F238E27FC236}">
+                <a16:creationId xmlns:a16="http://schemas.microsoft.com/office/drawing/2014/main" id="{8C64F1EC-1BB2-757D-FE20-A6EE22C6DCC5}"/>
+              </a:ext>
+            </a:extLst>
+          </p:cNvPr>
+          <p:cNvSpPr txBox="1"/>
+          <p:nvPr/>
+        </p:nvSpPr>
+        <p:spPr>
+          <a:xfrm>
+            <a:off x="-1" y="0"/>
+            <a:ext cx="12191999" cy="523220"/>
+          </a:xfrm>
+          <a:prstGeom prst="rect">
+            <a:avLst/>
+          </a:prstGeom>
+          <a:noFill/>
+        </p:spPr>
+        <p:txBody>
+          <a:bodyPr wrap="square" rtlCol="0">
+            <a:spAutoFit/>
+          </a:bodyPr>
+          <a:lstStyle/>
+          <a:p>
+            <a:r>
+              <a:rPr lang="en-US" sz="2800" dirty="0"/>
+              <a:t>SVM w/ manual resampling to minority class [</a:t>
+            </a:r>
+            <a:r>
+              <a:rPr lang="en-US" sz="2800" dirty="0" err="1"/>
+              <a:t>df</a:t>
+            </a:r>
+            <a:r>
+              <a:rPr lang="en-US" sz="2800" dirty="0"/>
+              <a:t> = 300uA]</a:t>
+            </a:r>
+          </a:p>
+        </p:txBody>
+      </p:sp>
+      <p:sp>
+        <p:nvSpPr>
+          <p:cNvPr id="5" name="TextBox 4">
+            <a:extLst>
+              <a:ext uri="{FF2B5EF4-FFF2-40B4-BE49-F238E27FC236}">
+                <a16:creationId xmlns:a16="http://schemas.microsoft.com/office/drawing/2014/main" id="{4763F35E-2BBD-DCC3-26CF-CB01E32AC0B1}"/>
+              </a:ext>
+            </a:extLst>
+          </p:cNvPr>
+          <p:cNvSpPr txBox="1"/>
+          <p:nvPr/>
+        </p:nvSpPr>
+        <p:spPr>
+          <a:xfrm>
+            <a:off x="-1" y="523220"/>
+            <a:ext cx="12191999" cy="1323439"/>
+          </a:xfrm>
+          <a:prstGeom prst="rect">
+            <a:avLst/>
+          </a:prstGeom>
+          <a:noFill/>
+        </p:spPr>
+        <p:txBody>
+          <a:bodyPr wrap="square" rtlCol="0">
+            <a:spAutoFit/>
+          </a:bodyPr>
+          <a:lstStyle/>
+          <a:p>
+            <a:r>
+              <a:rPr lang="en-US" sz="1600" dirty="0" err="1"/>
+              <a:t>feature_names</a:t>
+            </a:r>
+            <a:r>
+              <a:rPr lang="en-US" sz="1600" dirty="0"/>
+              <a:t> = ['</a:t>
+            </a:r>
+            <a:r>
+              <a:rPr lang="en-US" sz="1600" dirty="0" err="1"/>
+              <a:t>LeverZmax</a:t>
+            </a:r>
+            <a:r>
+              <a:rPr lang="en-US" sz="1600" dirty="0"/>
+              <a:t>','</a:t>
+            </a:r>
+            <a:r>
+              <a:rPr lang="en-US" sz="1600" dirty="0" err="1"/>
+              <a:t>HLZmax</a:t>
+            </a:r>
+            <a:r>
+              <a:rPr lang="en-US" sz="1600" dirty="0"/>
+              <a:t>','</a:t>
+            </a:r>
+            <a:r>
+              <a:rPr lang="en-US" sz="1600" dirty="0" err="1"/>
+              <a:t>NextLever</a:t>
+            </a:r>
+            <a:r>
+              <a:rPr lang="en-US" sz="1600" dirty="0"/>
+              <a:t>’] (‘Trial#’ excluded due to concerns of overfitting (too specific to this data))</a:t>
+            </a:r>
+          </a:p>
+          <a:p>
+            <a:r>
+              <a:rPr lang="en-US" sz="1600" dirty="0"/>
+              <a:t>Due to imbalance within the </a:t>
+            </a:r>
+            <a:r>
+              <a:rPr lang="en-US" sz="1600" dirty="0" err="1"/>
+              <a:t>NextLever</a:t>
+            </a:r>
+            <a:r>
+              <a:rPr lang="en-US" sz="1600" dirty="0"/>
+              <a:t> classes (small=109, large = 678), I </a:t>
+            </a:r>
+            <a:r>
+              <a:rPr lang="en-US" sz="1600" dirty="0" err="1"/>
+              <a:t>downsampled</a:t>
+            </a:r>
+            <a:r>
+              <a:rPr lang="en-US" sz="1600" dirty="0"/>
+              <a:t> </a:t>
+            </a:r>
+            <a:r>
+              <a:rPr lang="en-US" sz="1600" dirty="0" err="1"/>
+              <a:t>NextLever</a:t>
+            </a:r>
+            <a:r>
+              <a:rPr lang="en-US" sz="1600" dirty="0"/>
+              <a:t>=1 to be the size of </a:t>
+            </a:r>
+            <a:r>
+              <a:rPr lang="en-US" sz="1600" dirty="0" err="1"/>
+              <a:t>NextLever</a:t>
+            </a:r>
+            <a:r>
+              <a:rPr lang="en-US" sz="1600" dirty="0"/>
+              <a:t>=0 (109)</a:t>
+            </a:r>
+          </a:p>
+          <a:p>
+            <a:r>
+              <a:rPr lang="en-US" sz="1600" dirty="0" err="1"/>
+              <a:t>Dataframe</a:t>
+            </a:r>
+            <a:r>
+              <a:rPr lang="en-US" sz="1600" dirty="0"/>
+              <a:t> was normalized (</a:t>
+            </a:r>
+            <a:r>
+              <a:rPr lang="en-US" sz="1600" dirty="0" err="1"/>
+              <a:t>StandardScaler</a:t>
+            </a:r>
+            <a:r>
+              <a:rPr lang="en-US" sz="1600" dirty="0"/>
+              <a:t>()) prior to model training</a:t>
+            </a:r>
+          </a:p>
+          <a:p>
+            <a:r>
+              <a:rPr lang="en-US" sz="1600" dirty="0" err="1"/>
+              <a:t>svm_model</a:t>
+            </a:r>
+            <a:r>
+              <a:rPr lang="en-US" sz="1600" dirty="0"/>
+              <a:t> = SVC(kernel='linear', </a:t>
+            </a:r>
+            <a:r>
+              <a:rPr lang="en-US" sz="1600" dirty="0" err="1"/>
+              <a:t>class_weight</a:t>
+            </a:r>
+            <a:r>
+              <a:rPr lang="en-US" sz="1600" dirty="0"/>
+              <a:t>='balanced', probability=True)</a:t>
+            </a:r>
+          </a:p>
+          <a:p>
+            <a:endParaRPr lang="en-US" sz="1600" dirty="0"/>
+          </a:p>
+        </p:txBody>
+      </p:sp>
+      <p:pic>
+        <p:nvPicPr>
+          <p:cNvPr id="6" name="Picture 5">
+            <a:extLst>
+              <a:ext uri="{FF2B5EF4-FFF2-40B4-BE49-F238E27FC236}">
+                <a16:creationId xmlns:a16="http://schemas.microsoft.com/office/drawing/2014/main" id="{6AE4BD07-CF64-36E0-FAF8-61B08200529A}"/>
+              </a:ext>
+            </a:extLst>
+          </p:cNvPr>
+          <p:cNvPicPr>
+            <a:picLocks noChangeAspect="1"/>
+          </p:cNvPicPr>
+          <p:nvPr/>
+        </p:nvPicPr>
+        <p:blipFill>
+          <a:blip r:embed="rId2"/>
+          <a:stretch>
+            <a:fillRect/>
+          </a:stretch>
+        </p:blipFill>
+        <p:spPr>
+          <a:xfrm>
+            <a:off x="141004" y="1617203"/>
+            <a:ext cx="2628322" cy="1571120"/>
+          </a:xfrm>
+          <a:prstGeom prst="rect">
+            <a:avLst/>
+          </a:prstGeom>
+        </p:spPr>
+      </p:pic>
+      <p:pic>
+        <p:nvPicPr>
+          <p:cNvPr id="9" name="Picture 8">
+            <a:extLst>
+              <a:ext uri="{FF2B5EF4-FFF2-40B4-BE49-F238E27FC236}">
+                <a16:creationId xmlns:a16="http://schemas.microsoft.com/office/drawing/2014/main" id="{D667C8EA-6535-FF3C-ECE3-E138FF1EC9BB}"/>
+              </a:ext>
+            </a:extLst>
+          </p:cNvPr>
+          <p:cNvPicPr>
+            <a:picLocks noChangeAspect="1"/>
+          </p:cNvPicPr>
+          <p:nvPr/>
+        </p:nvPicPr>
+        <p:blipFill>
+          <a:blip r:embed="rId3"/>
+          <a:stretch>
+            <a:fillRect/>
+          </a:stretch>
+        </p:blipFill>
+        <p:spPr>
+          <a:xfrm>
+            <a:off x="2910331" y="1584375"/>
+            <a:ext cx="2038741" cy="1604891"/>
+          </a:xfrm>
+          <a:prstGeom prst="rect">
+            <a:avLst/>
+          </a:prstGeom>
+        </p:spPr>
+      </p:pic>
+      <p:pic>
+        <p:nvPicPr>
+          <p:cNvPr id="11" name="Picture 10">
+            <a:extLst>
+              <a:ext uri="{FF2B5EF4-FFF2-40B4-BE49-F238E27FC236}">
+                <a16:creationId xmlns:a16="http://schemas.microsoft.com/office/drawing/2014/main" id="{D3C0E9A1-E853-786A-E05E-FD78E1E30CE5}"/>
+              </a:ext>
+            </a:extLst>
+          </p:cNvPr>
+          <p:cNvPicPr>
+            <a:picLocks noChangeAspect="1"/>
+          </p:cNvPicPr>
+          <p:nvPr/>
+        </p:nvPicPr>
+        <p:blipFill>
+          <a:blip r:embed="rId4"/>
+          <a:stretch>
+            <a:fillRect/>
+          </a:stretch>
+        </p:blipFill>
+        <p:spPr>
+          <a:xfrm>
+            <a:off x="5090077" y="1560037"/>
+            <a:ext cx="2254549" cy="1628286"/>
+          </a:xfrm>
+          <a:prstGeom prst="rect">
+            <a:avLst/>
+          </a:prstGeom>
+        </p:spPr>
+      </p:pic>
+      <p:pic>
+        <p:nvPicPr>
+          <p:cNvPr id="14" name="Picture 13">
+            <a:extLst>
+              <a:ext uri="{FF2B5EF4-FFF2-40B4-BE49-F238E27FC236}">
+                <a16:creationId xmlns:a16="http://schemas.microsoft.com/office/drawing/2014/main" id="{F841531B-9EB5-E210-ADA5-57E1F1281CE8}"/>
+              </a:ext>
+            </a:extLst>
+          </p:cNvPr>
+          <p:cNvPicPr>
+            <a:picLocks noChangeAspect="1"/>
+          </p:cNvPicPr>
+          <p:nvPr/>
+        </p:nvPicPr>
+        <p:blipFill>
+          <a:blip r:embed="rId5"/>
+          <a:stretch>
+            <a:fillRect/>
+          </a:stretch>
+        </p:blipFill>
+        <p:spPr>
+          <a:xfrm>
+            <a:off x="255458" y="3567795"/>
+            <a:ext cx="3033908" cy="3096171"/>
+          </a:xfrm>
+          <a:prstGeom prst="rect">
+            <a:avLst/>
+          </a:prstGeom>
+        </p:spPr>
+      </p:pic>
+      <p:pic>
+        <p:nvPicPr>
+          <p:cNvPr id="17" name="Picture 16">
+            <a:extLst>
+              <a:ext uri="{FF2B5EF4-FFF2-40B4-BE49-F238E27FC236}">
+                <a16:creationId xmlns:a16="http://schemas.microsoft.com/office/drawing/2014/main" id="{BB0281A9-6259-62D3-F7E1-C7882B482FB0}"/>
+              </a:ext>
+            </a:extLst>
+          </p:cNvPr>
+          <p:cNvPicPr>
+            <a:picLocks noChangeAspect="1"/>
+          </p:cNvPicPr>
+          <p:nvPr/>
+        </p:nvPicPr>
+        <p:blipFill>
+          <a:blip r:embed="rId6"/>
+          <a:stretch>
+            <a:fillRect/>
+          </a:stretch>
+        </p:blipFill>
+        <p:spPr>
+          <a:xfrm>
+            <a:off x="3738854" y="3567794"/>
+            <a:ext cx="3033909" cy="3096172"/>
+          </a:xfrm>
+          <a:prstGeom prst="rect">
+            <a:avLst/>
+          </a:prstGeom>
+        </p:spPr>
+      </p:pic>
+      <p:pic>
+        <p:nvPicPr>
+          <p:cNvPr id="22" name="Picture 21">
+            <a:extLst>
+              <a:ext uri="{FF2B5EF4-FFF2-40B4-BE49-F238E27FC236}">
+                <a16:creationId xmlns:a16="http://schemas.microsoft.com/office/drawing/2014/main" id="{D6A2C402-887B-2874-B84D-D074C7B6F55A}"/>
+              </a:ext>
+            </a:extLst>
+          </p:cNvPr>
+          <p:cNvPicPr>
+            <a:picLocks noChangeAspect="1"/>
+          </p:cNvPicPr>
+          <p:nvPr/>
+        </p:nvPicPr>
+        <p:blipFill>
+          <a:blip r:embed="rId7"/>
           <a:stretch>
             <a:fillRect/>
           </a:stretch>

</xml_diff>

<commit_message>
return since data crash
</commit_message>
<xml_diff>
--- a/PhotometryML.pptx
+++ b/PhotometryML.pptx
@@ -120,6 +120,58 @@
 </p:presentation>
 </file>
 
+<file path=ppt/revisionInfo.xml><?xml version="1.0" encoding="utf-8"?>
+<p1510:revInfo xmlns:a="http://schemas.openxmlformats.org/drawingml/2006/main" xmlns:r="http://schemas.openxmlformats.org/officeDocument/2006/relationships" xmlns:p1510="http://schemas.microsoft.com/office/powerpoint/2015/10/main">
+  <p1510:revLst>
+    <p1510:client id="{18A941A5-279B-4D9B-9F21-9A61A06FF86E}" v="1" dt="2024-08-02T02:19:12.944"/>
+  </p1510:revLst>
+</p1510:revInfo>
+</file>
+
+<file path=ppt/changesInfos/changesInfo1.xml><?xml version="1.0" encoding="utf-8"?>
+<pc:chgInfo xmlns:a="http://schemas.openxmlformats.org/drawingml/2006/main" xmlns:r="http://schemas.openxmlformats.org/officeDocument/2006/relationships" xmlns:ac="http://schemas.microsoft.com/office/drawing/2013/main/command" xmlns:pc="http://schemas.microsoft.com/office/powerpoint/2013/main/command">
+  <pc:docChgLst>
+    <pc:chgData name="Pyon,Wonn S" userId="c7aefe60-a0de-4fb3-886b-1462c0f4a15c" providerId="ADAL" clId="{18A941A5-279B-4D9B-9F21-9A61A06FF86E}"/>
+    <pc:docChg chg="custSel modSld">
+      <pc:chgData name="Pyon,Wonn S" userId="c7aefe60-a0de-4fb3-886b-1462c0f4a15c" providerId="ADAL" clId="{18A941A5-279B-4D9B-9F21-9A61A06FF86E}" dt="2024-08-02T02:19:22.352" v="4" actId="478"/>
+      <pc:docMkLst>
+        <pc:docMk/>
+      </pc:docMkLst>
+      <pc:sldChg chg="addSp delSp modSp mod">
+        <pc:chgData name="Pyon,Wonn S" userId="c7aefe60-a0de-4fb3-886b-1462c0f4a15c" providerId="ADAL" clId="{18A941A5-279B-4D9B-9F21-9A61A06FF86E}" dt="2024-08-02T02:19:22.352" v="4" actId="478"/>
+        <pc:sldMkLst>
+          <pc:docMk/>
+          <pc:sldMk cId="3673034133" sldId="258"/>
+        </pc:sldMkLst>
+        <pc:picChg chg="add del mod">
+          <ac:chgData name="Pyon,Wonn S" userId="c7aefe60-a0de-4fb3-886b-1462c0f4a15c" providerId="ADAL" clId="{18A941A5-279B-4D9B-9F21-9A61A06FF86E}" dt="2024-08-02T02:19:22.352" v="4" actId="478"/>
+          <ac:picMkLst>
+            <pc:docMk/>
+            <pc:sldMk cId="3673034133" sldId="258"/>
+            <ac:picMk id="3" creationId="{DCF72137-8B49-37D0-77B5-081AF029CA55}"/>
+          </ac:picMkLst>
+        </pc:picChg>
+      </pc:sldChg>
+      <pc:sldChg chg="modSp mod">
+        <pc:chgData name="Pyon,Wonn S" userId="c7aefe60-a0de-4fb3-886b-1462c0f4a15c" providerId="ADAL" clId="{18A941A5-279B-4D9B-9F21-9A61A06FF86E}" dt="2024-08-02T02:19:10.643" v="0" actId="1076"/>
+        <pc:sldMkLst>
+          <pc:docMk/>
+          <pc:sldMk cId="4027714010" sldId="263"/>
+        </pc:sldMkLst>
+        <pc:picChg chg="mod">
+          <ac:chgData name="Pyon,Wonn S" userId="c7aefe60-a0de-4fb3-886b-1462c0f4a15c" providerId="ADAL" clId="{18A941A5-279B-4D9B-9F21-9A61A06FF86E}" dt="2024-08-02T02:19:10.643" v="0" actId="1076"/>
+          <ac:picMkLst>
+            <pc:docMk/>
+            <pc:sldMk cId="4027714010" sldId="263"/>
+            <ac:picMk id="4" creationId="{B34836F0-603B-2A3E-51F1-B5FFCE348FCA}"/>
+          </ac:picMkLst>
+        </pc:picChg>
+      </pc:sldChg>
+    </pc:docChg>
+  </pc:docChgLst>
+</pc:chgInfo>
+</file>
+
 <file path=ppt/slideLayouts/slideLayout1.xml><?xml version="1.0" encoding="utf-8"?>
 <p:sldLayout xmlns:a="http://schemas.openxmlformats.org/drawingml/2006/main" xmlns:r="http://schemas.openxmlformats.org/officeDocument/2006/relationships" xmlns:p="http://schemas.openxmlformats.org/presentationml/2006/main" type="title" preserve="1">
   <p:cSld name="Title Slide">
@@ -267,7 +319,7 @@
           <a:p>
             <a:fld id="{0629DF27-FCFD-4372-AAF6-F331E8A67D77}" type="datetimeFigureOut">
               <a:rPr lang="en-US" smtClean="0"/>
-              <a:t>1/4/2024</a:t>
+              <a:t>8/1/2024</a:t>
             </a:fld>
             <a:endParaRPr lang="en-US"/>
           </a:p>
@@ -465,7 +517,7 @@
           <a:p>
             <a:fld id="{0629DF27-FCFD-4372-AAF6-F331E8A67D77}" type="datetimeFigureOut">
               <a:rPr lang="en-US" smtClean="0"/>
-              <a:t>1/4/2024</a:t>
+              <a:t>8/1/2024</a:t>
             </a:fld>
             <a:endParaRPr lang="en-US"/>
           </a:p>
@@ -673,7 +725,7 @@
           <a:p>
             <a:fld id="{0629DF27-FCFD-4372-AAF6-F331E8A67D77}" type="datetimeFigureOut">
               <a:rPr lang="en-US" smtClean="0"/>
-              <a:t>1/4/2024</a:t>
+              <a:t>8/1/2024</a:t>
             </a:fld>
             <a:endParaRPr lang="en-US"/>
           </a:p>
@@ -871,7 +923,7 @@
           <a:p>
             <a:fld id="{0629DF27-FCFD-4372-AAF6-F331E8A67D77}" type="datetimeFigureOut">
               <a:rPr lang="en-US" smtClean="0"/>
-              <a:t>1/4/2024</a:t>
+              <a:t>8/1/2024</a:t>
             </a:fld>
             <a:endParaRPr lang="en-US"/>
           </a:p>
@@ -1146,7 +1198,7 @@
           <a:p>
             <a:fld id="{0629DF27-FCFD-4372-AAF6-F331E8A67D77}" type="datetimeFigureOut">
               <a:rPr lang="en-US" smtClean="0"/>
-              <a:t>1/4/2024</a:t>
+              <a:t>8/1/2024</a:t>
             </a:fld>
             <a:endParaRPr lang="en-US"/>
           </a:p>
@@ -1411,7 +1463,7 @@
           <a:p>
             <a:fld id="{0629DF27-FCFD-4372-AAF6-F331E8A67D77}" type="datetimeFigureOut">
               <a:rPr lang="en-US" smtClean="0"/>
-              <a:t>1/4/2024</a:t>
+              <a:t>8/1/2024</a:t>
             </a:fld>
             <a:endParaRPr lang="en-US"/>
           </a:p>
@@ -1823,7 +1875,7 @@
           <a:p>
             <a:fld id="{0629DF27-FCFD-4372-AAF6-F331E8A67D77}" type="datetimeFigureOut">
               <a:rPr lang="en-US" smtClean="0"/>
-              <a:t>1/4/2024</a:t>
+              <a:t>8/1/2024</a:t>
             </a:fld>
             <a:endParaRPr lang="en-US"/>
           </a:p>
@@ -1964,7 +2016,7 @@
           <a:p>
             <a:fld id="{0629DF27-FCFD-4372-AAF6-F331E8A67D77}" type="datetimeFigureOut">
               <a:rPr lang="en-US" smtClean="0"/>
-              <a:t>1/4/2024</a:t>
+              <a:t>8/1/2024</a:t>
             </a:fld>
             <a:endParaRPr lang="en-US"/>
           </a:p>
@@ -2077,7 +2129,7 @@
           <a:p>
             <a:fld id="{0629DF27-FCFD-4372-AAF6-F331E8A67D77}" type="datetimeFigureOut">
               <a:rPr lang="en-US" smtClean="0"/>
-              <a:t>1/4/2024</a:t>
+              <a:t>8/1/2024</a:t>
             </a:fld>
             <a:endParaRPr lang="en-US"/>
           </a:p>
@@ -2388,7 +2440,7 @@
           <a:p>
             <a:fld id="{0629DF27-FCFD-4372-AAF6-F331E8A67D77}" type="datetimeFigureOut">
               <a:rPr lang="en-US" smtClean="0"/>
-              <a:t>1/4/2024</a:t>
+              <a:t>8/1/2024</a:t>
             </a:fld>
             <a:endParaRPr lang="en-US"/>
           </a:p>
@@ -2676,7 +2728,7 @@
           <a:p>
             <a:fld id="{0629DF27-FCFD-4372-AAF6-F331E8A67D77}" type="datetimeFigureOut">
               <a:rPr lang="en-US" smtClean="0"/>
-              <a:t>1/4/2024</a:t>
+              <a:t>8/1/2024</a:t>
             </a:fld>
             <a:endParaRPr lang="en-US"/>
           </a:p>
@@ -2917,7 +2969,7 @@
           <a:p>
             <a:fld id="{0629DF27-FCFD-4372-AAF6-F331E8A67D77}" type="datetimeFigureOut">
               <a:rPr lang="en-US" smtClean="0"/>
-              <a:t>1/4/2024</a:t>
+              <a:t>8/1/2024</a:t>
             </a:fld>
             <a:endParaRPr lang="en-US"/>
           </a:p>
@@ -4112,7 +4164,7 @@
         </p:blipFill>
         <p:spPr>
           <a:xfrm>
-            <a:off x="108927" y="661862"/>
+            <a:off x="169312" y="661862"/>
             <a:ext cx="11673497" cy="1151114"/>
           </a:xfrm>
           <a:prstGeom prst="rect">

</xml_diff>